<commit_message>
Added the picture of the case with the new label.
</commit_message>
<xml_diff>
--- a/ChaprSVN/Promo/Presentation for FTC.pptx
+++ b/ChaprSVN/Promo/Presentation for FTC.pptx
@@ -296,7 +296,8 @@
           <a:p>
             <a:fld id="{2F402DE8-62D5-4C8C-AED6-53CCAA8B3F71}" type="datetimeFigureOut">
               <a:rPr lang="en-US" smtClean="0"/>
-              <a:t>10/17/2013</a:t>
+              <a:pPr/>
+              <a:t>10/20/2013</a:t>
             </a:fld>
             <a:endParaRPr lang="en-US"/>
           </a:p>
@@ -338,6 +339,7 @@
           <a:p>
             <a:fld id="{06037A32-0AC5-43F1-9C47-18113E5E1BC0}" type="slidenum">
               <a:rPr lang="en-US" smtClean="0"/>
+              <a:pPr/>
               <a:t>‹#›</a:t>
             </a:fld>
             <a:endParaRPr lang="en-US"/>
@@ -461,7 +463,8 @@
           <a:p>
             <a:fld id="{2F402DE8-62D5-4C8C-AED6-53CCAA8B3F71}" type="datetimeFigureOut">
               <a:rPr lang="en-US" smtClean="0"/>
-              <a:t>10/17/2013</a:t>
+              <a:pPr/>
+              <a:t>10/20/2013</a:t>
             </a:fld>
             <a:endParaRPr lang="en-US"/>
           </a:p>
@@ -503,6 +506,7 @@
           <a:p>
             <a:fld id="{06037A32-0AC5-43F1-9C47-18113E5E1BC0}" type="slidenum">
               <a:rPr lang="en-US" smtClean="0"/>
+              <a:pPr/>
               <a:t>‹#›</a:t>
             </a:fld>
             <a:endParaRPr lang="en-US"/>
@@ -636,7 +640,8 @@
           <a:p>
             <a:fld id="{2F402DE8-62D5-4C8C-AED6-53CCAA8B3F71}" type="datetimeFigureOut">
               <a:rPr lang="en-US" smtClean="0"/>
-              <a:t>10/17/2013</a:t>
+              <a:pPr/>
+              <a:t>10/20/2013</a:t>
             </a:fld>
             <a:endParaRPr lang="en-US"/>
           </a:p>
@@ -678,6 +683,7 @@
           <a:p>
             <a:fld id="{06037A32-0AC5-43F1-9C47-18113E5E1BC0}" type="slidenum">
               <a:rPr lang="en-US" smtClean="0"/>
+              <a:pPr/>
               <a:t>‹#›</a:t>
             </a:fld>
             <a:endParaRPr lang="en-US"/>
@@ -801,7 +807,8 @@
           <a:p>
             <a:fld id="{2F402DE8-62D5-4C8C-AED6-53CCAA8B3F71}" type="datetimeFigureOut">
               <a:rPr lang="en-US" smtClean="0"/>
-              <a:t>10/17/2013</a:t>
+              <a:pPr/>
+              <a:t>10/20/2013</a:t>
             </a:fld>
             <a:endParaRPr lang="en-US"/>
           </a:p>
@@ -843,6 +850,7 @@
           <a:p>
             <a:fld id="{06037A32-0AC5-43F1-9C47-18113E5E1BC0}" type="slidenum">
               <a:rPr lang="en-US" smtClean="0"/>
+              <a:pPr/>
               <a:t>‹#›</a:t>
             </a:fld>
             <a:endParaRPr lang="en-US"/>
@@ -1042,7 +1050,8 @@
           <a:p>
             <a:fld id="{2F402DE8-62D5-4C8C-AED6-53CCAA8B3F71}" type="datetimeFigureOut">
               <a:rPr lang="en-US" smtClean="0"/>
-              <a:t>10/17/2013</a:t>
+              <a:pPr/>
+              <a:t>10/20/2013</a:t>
             </a:fld>
             <a:endParaRPr lang="en-US"/>
           </a:p>
@@ -1084,6 +1093,7 @@
           <a:p>
             <a:fld id="{06037A32-0AC5-43F1-9C47-18113E5E1BC0}" type="slidenum">
               <a:rPr lang="en-US" smtClean="0"/>
+              <a:pPr/>
               <a:t>‹#›</a:t>
             </a:fld>
             <a:endParaRPr lang="en-US"/>
@@ -1325,7 +1335,8 @@
           <a:p>
             <a:fld id="{2F402DE8-62D5-4C8C-AED6-53CCAA8B3F71}" type="datetimeFigureOut">
               <a:rPr lang="en-US" smtClean="0"/>
-              <a:t>10/17/2013</a:t>
+              <a:pPr/>
+              <a:t>10/20/2013</a:t>
             </a:fld>
             <a:endParaRPr lang="en-US"/>
           </a:p>
@@ -1367,6 +1378,7 @@
           <a:p>
             <a:fld id="{06037A32-0AC5-43F1-9C47-18113E5E1BC0}" type="slidenum">
               <a:rPr lang="en-US" smtClean="0"/>
+              <a:pPr/>
               <a:t>‹#›</a:t>
             </a:fld>
             <a:endParaRPr lang="en-US"/>
@@ -1742,7 +1754,8 @@
           <a:p>
             <a:fld id="{2F402DE8-62D5-4C8C-AED6-53CCAA8B3F71}" type="datetimeFigureOut">
               <a:rPr lang="en-US" smtClean="0"/>
-              <a:t>10/17/2013</a:t>
+              <a:pPr/>
+              <a:t>10/20/2013</a:t>
             </a:fld>
             <a:endParaRPr lang="en-US"/>
           </a:p>
@@ -1784,6 +1797,7 @@
           <a:p>
             <a:fld id="{06037A32-0AC5-43F1-9C47-18113E5E1BC0}" type="slidenum">
               <a:rPr lang="en-US" smtClean="0"/>
+              <a:pPr/>
               <a:t>‹#›</a:t>
             </a:fld>
             <a:endParaRPr lang="en-US"/>
@@ -1855,7 +1869,8 @@
           <a:p>
             <a:fld id="{2F402DE8-62D5-4C8C-AED6-53CCAA8B3F71}" type="datetimeFigureOut">
               <a:rPr lang="en-US" smtClean="0"/>
-              <a:t>10/17/2013</a:t>
+              <a:pPr/>
+              <a:t>10/20/2013</a:t>
             </a:fld>
             <a:endParaRPr lang="en-US"/>
           </a:p>
@@ -1897,6 +1912,7 @@
           <a:p>
             <a:fld id="{06037A32-0AC5-43F1-9C47-18113E5E1BC0}" type="slidenum">
               <a:rPr lang="en-US" smtClean="0"/>
+              <a:pPr/>
               <a:t>‹#›</a:t>
             </a:fld>
             <a:endParaRPr lang="en-US"/>
@@ -1945,7 +1961,8 @@
           <a:p>
             <a:fld id="{2F402DE8-62D5-4C8C-AED6-53CCAA8B3F71}" type="datetimeFigureOut">
               <a:rPr lang="en-US" smtClean="0"/>
-              <a:t>10/17/2013</a:t>
+              <a:pPr/>
+              <a:t>10/20/2013</a:t>
             </a:fld>
             <a:endParaRPr lang="en-US"/>
           </a:p>
@@ -1987,6 +2004,7 @@
           <a:p>
             <a:fld id="{06037A32-0AC5-43F1-9C47-18113E5E1BC0}" type="slidenum">
               <a:rPr lang="en-US" smtClean="0"/>
+              <a:pPr/>
               <a:t>‹#›</a:t>
             </a:fld>
             <a:endParaRPr lang="en-US"/>
@@ -2217,7 +2235,8 @@
           <a:p>
             <a:fld id="{2F402DE8-62D5-4C8C-AED6-53CCAA8B3F71}" type="datetimeFigureOut">
               <a:rPr lang="en-US" smtClean="0"/>
-              <a:t>10/17/2013</a:t>
+              <a:pPr/>
+              <a:t>10/20/2013</a:t>
             </a:fld>
             <a:endParaRPr lang="en-US"/>
           </a:p>
@@ -2259,6 +2278,7 @@
           <a:p>
             <a:fld id="{06037A32-0AC5-43F1-9C47-18113E5E1BC0}" type="slidenum">
               <a:rPr lang="en-US" smtClean="0"/>
+              <a:pPr/>
               <a:t>‹#›</a:t>
             </a:fld>
             <a:endParaRPr lang="en-US"/>
@@ -2465,7 +2485,8 @@
           <a:p>
             <a:fld id="{2F402DE8-62D5-4C8C-AED6-53CCAA8B3F71}" type="datetimeFigureOut">
               <a:rPr lang="en-US" smtClean="0"/>
-              <a:t>10/17/2013</a:t>
+              <a:pPr/>
+              <a:t>10/20/2013</a:t>
             </a:fld>
             <a:endParaRPr lang="en-US"/>
           </a:p>
@@ -2507,6 +2528,7 @@
           <a:p>
             <a:fld id="{06037A32-0AC5-43F1-9C47-18113E5E1BC0}" type="slidenum">
               <a:rPr lang="en-US" smtClean="0"/>
+              <a:pPr/>
               <a:t>‹#›</a:t>
             </a:fld>
             <a:endParaRPr lang="en-US"/>
@@ -2673,7 +2695,8 @@
           <a:p>
             <a:fld id="{2F402DE8-62D5-4C8C-AED6-53CCAA8B3F71}" type="datetimeFigureOut">
               <a:rPr lang="en-US" smtClean="0"/>
-              <a:t>10/17/2013</a:t>
+              <a:pPr/>
+              <a:t>10/20/2013</a:t>
             </a:fld>
             <a:endParaRPr lang="en-US"/>
           </a:p>
@@ -2751,6 +2774,7 @@
           <a:p>
             <a:fld id="{06037A32-0AC5-43F1-9C47-18113E5E1BC0}" type="slidenum">
               <a:rPr lang="en-US" smtClean="0"/>
+              <a:pPr/>
               <a:t>‹#›</a:t>
             </a:fld>
             <a:endParaRPr lang="en-US"/>

</xml_diff>

<commit_message>
Added more pictures and updated the presentation for FTC.
</commit_message>
<xml_diff>
--- a/ChaprSVN/Promo/Presentation for FTC.pptx
+++ b/ChaprSVN/Promo/Presentation for FTC.pptx
@@ -8,12 +8,15 @@
     <p:sldId id="256" r:id="rId2"/>
     <p:sldId id="257" r:id="rId3"/>
     <p:sldId id="262" r:id="rId4"/>
-    <p:sldId id="258" r:id="rId5"/>
-    <p:sldId id="260" r:id="rId6"/>
-    <p:sldId id="265" r:id="rId7"/>
-    <p:sldId id="261" r:id="rId8"/>
-    <p:sldId id="263" r:id="rId9"/>
-    <p:sldId id="264" r:id="rId10"/>
+    <p:sldId id="266" r:id="rId5"/>
+    <p:sldId id="267" r:id="rId6"/>
+    <p:sldId id="268" r:id="rId7"/>
+    <p:sldId id="269" r:id="rId8"/>
+    <p:sldId id="260" r:id="rId9"/>
+    <p:sldId id="265" r:id="rId10"/>
+    <p:sldId id="261" r:id="rId11"/>
+    <p:sldId id="263" r:id="rId12"/>
+    <p:sldId id="264" r:id="rId13"/>
   </p:sldIdLst>
   <p:sldSz cx="9144000" cy="6858000" type="screen4x3"/>
   <p:notesSz cx="6858000" cy="9144000"/>
@@ -297,7 +300,7 @@
             <a:fld id="{2F402DE8-62D5-4C8C-AED6-53CCAA8B3F71}" type="datetimeFigureOut">
               <a:rPr lang="en-US" smtClean="0"/>
               <a:pPr/>
-              <a:t>10/20/2013</a:t>
+              <a:t>10/21/2013</a:t>
             </a:fld>
             <a:endParaRPr lang="en-US"/>
           </a:p>
@@ -464,7 +467,7 @@
             <a:fld id="{2F402DE8-62D5-4C8C-AED6-53CCAA8B3F71}" type="datetimeFigureOut">
               <a:rPr lang="en-US" smtClean="0"/>
               <a:pPr/>
-              <a:t>10/20/2013</a:t>
+              <a:t>10/21/2013</a:t>
             </a:fld>
             <a:endParaRPr lang="en-US"/>
           </a:p>
@@ -641,7 +644,7 @@
             <a:fld id="{2F402DE8-62D5-4C8C-AED6-53CCAA8B3F71}" type="datetimeFigureOut">
               <a:rPr lang="en-US" smtClean="0"/>
               <a:pPr/>
-              <a:t>10/20/2013</a:t>
+              <a:t>10/21/2013</a:t>
             </a:fld>
             <a:endParaRPr lang="en-US"/>
           </a:p>
@@ -808,7 +811,7 @@
             <a:fld id="{2F402DE8-62D5-4C8C-AED6-53CCAA8B3F71}" type="datetimeFigureOut">
               <a:rPr lang="en-US" smtClean="0"/>
               <a:pPr/>
-              <a:t>10/20/2013</a:t>
+              <a:t>10/21/2013</a:t>
             </a:fld>
             <a:endParaRPr lang="en-US"/>
           </a:p>
@@ -1051,7 +1054,7 @@
             <a:fld id="{2F402DE8-62D5-4C8C-AED6-53CCAA8B3F71}" type="datetimeFigureOut">
               <a:rPr lang="en-US" smtClean="0"/>
               <a:pPr/>
-              <a:t>10/20/2013</a:t>
+              <a:t>10/21/2013</a:t>
             </a:fld>
             <a:endParaRPr lang="en-US"/>
           </a:p>
@@ -1336,7 +1339,7 @@
             <a:fld id="{2F402DE8-62D5-4C8C-AED6-53CCAA8B3F71}" type="datetimeFigureOut">
               <a:rPr lang="en-US" smtClean="0"/>
               <a:pPr/>
-              <a:t>10/20/2013</a:t>
+              <a:t>10/21/2013</a:t>
             </a:fld>
             <a:endParaRPr lang="en-US"/>
           </a:p>
@@ -1755,7 +1758,7 @@
             <a:fld id="{2F402DE8-62D5-4C8C-AED6-53CCAA8B3F71}" type="datetimeFigureOut">
               <a:rPr lang="en-US" smtClean="0"/>
               <a:pPr/>
-              <a:t>10/20/2013</a:t>
+              <a:t>10/21/2013</a:t>
             </a:fld>
             <a:endParaRPr lang="en-US"/>
           </a:p>
@@ -1870,7 +1873,7 @@
             <a:fld id="{2F402DE8-62D5-4C8C-AED6-53CCAA8B3F71}" type="datetimeFigureOut">
               <a:rPr lang="en-US" smtClean="0"/>
               <a:pPr/>
-              <a:t>10/20/2013</a:t>
+              <a:t>10/21/2013</a:t>
             </a:fld>
             <a:endParaRPr lang="en-US"/>
           </a:p>
@@ -1962,7 +1965,7 @@
             <a:fld id="{2F402DE8-62D5-4C8C-AED6-53CCAA8B3F71}" type="datetimeFigureOut">
               <a:rPr lang="en-US" smtClean="0"/>
               <a:pPr/>
-              <a:t>10/20/2013</a:t>
+              <a:t>10/21/2013</a:t>
             </a:fld>
             <a:endParaRPr lang="en-US"/>
           </a:p>
@@ -2236,7 +2239,7 @@
             <a:fld id="{2F402DE8-62D5-4C8C-AED6-53CCAA8B3F71}" type="datetimeFigureOut">
               <a:rPr lang="en-US" smtClean="0"/>
               <a:pPr/>
-              <a:t>10/20/2013</a:t>
+              <a:t>10/21/2013</a:t>
             </a:fld>
             <a:endParaRPr lang="en-US"/>
           </a:p>
@@ -2486,7 +2489,7 @@
             <a:fld id="{2F402DE8-62D5-4C8C-AED6-53CCAA8B3F71}" type="datetimeFigureOut">
               <a:rPr lang="en-US" smtClean="0"/>
               <a:pPr/>
-              <a:t>10/20/2013</a:t>
+              <a:t>10/21/2013</a:t>
             </a:fld>
             <a:endParaRPr lang="en-US"/>
           </a:p>
@@ -2696,7 +2699,7 @@
             <a:fld id="{2F402DE8-62D5-4C8C-AED6-53CCAA8B3F71}" type="datetimeFigureOut">
               <a:rPr lang="en-US" smtClean="0"/>
               <a:pPr/>
-              <a:t>10/20/2013</a:t>
+              <a:t>10/21/2013</a:t>
             </a:fld>
             <a:endParaRPr lang="en-US"/>
           </a:p>
@@ -3134,6 +3137,257 @@
   <p:clrMapOvr>
     <a:masterClrMapping/>
   </p:clrMapOvr>
+  <p:timing>
+    <p:tnLst>
+      <p:par>
+        <p:cTn id="1" dur="indefinite" restart="never" nodeType="tmRoot"/>
+      </p:par>
+    </p:tnLst>
+  </p:timing>
+</p:sld>
+</file>
+
+<file path=ppt/slides/slide10.xml><?xml version="1.0" encoding="utf-8"?>
+<p:sld xmlns:a="http://schemas.openxmlformats.org/drawingml/2006/main" xmlns:r="http://schemas.openxmlformats.org/officeDocument/2006/relationships" xmlns:p="http://schemas.openxmlformats.org/presentationml/2006/main">
+  <p:cSld>
+    <p:spTree>
+      <p:nvGrpSpPr>
+        <p:cNvPr id="1" name=""/>
+        <p:cNvGrpSpPr/>
+        <p:nvPr/>
+      </p:nvGrpSpPr>
+      <p:grpSpPr>
+        <a:xfrm>
+          <a:off x="0" y="0"/>
+          <a:ext cx="0" cy="0"/>
+          <a:chOff x="0" y="0"/>
+          <a:chExt cx="0" cy="0"/>
+        </a:xfrm>
+      </p:grpSpPr>
+      <p:sp>
+        <p:nvSpPr>
+          <p:cNvPr id="2" name="Title 1"/>
+          <p:cNvSpPr>
+            <a:spLocks noGrp="1"/>
+          </p:cNvSpPr>
+          <p:nvPr>
+            <p:ph type="title"/>
+          </p:nvPr>
+        </p:nvSpPr>
+        <p:spPr/>
+        <p:txBody>
+          <a:bodyPr/>
+          <a:lstStyle/>
+          <a:p>
+            <a:r>
+              <a:rPr lang="en-US" dirty="0" smtClean="0"/>
+              <a:t>The Hardware</a:t>
+            </a:r>
+            <a:endParaRPr lang="en-US" dirty="0"/>
+          </a:p>
+        </p:txBody>
+      </p:sp>
+      <p:sp>
+        <p:nvSpPr>
+          <p:cNvPr id="3" name="Content Placeholder 2"/>
+          <p:cNvSpPr>
+            <a:spLocks noGrp="1"/>
+          </p:cNvSpPr>
+          <p:nvPr>
+            <p:ph idx="1"/>
+          </p:nvPr>
+        </p:nvSpPr>
+        <p:spPr/>
+        <p:txBody>
+          <a:bodyPr/>
+          <a:lstStyle/>
+          <a:p>
+            <a:r>
+              <a:rPr lang="en-US" dirty="0" err="1" smtClean="0"/>
+              <a:t>Arduino</a:t>
+            </a:r>
+            <a:r>
+              <a:rPr lang="en-US" dirty="0" smtClean="0"/>
+              <a:t> Pro-Mini</a:t>
+            </a:r>
+          </a:p>
+          <a:p>
+            <a:r>
+              <a:rPr lang="en-US" dirty="0" smtClean="0"/>
+              <a:t>RN-42</a:t>
+            </a:r>
+          </a:p>
+          <a:p>
+            <a:r>
+              <a:rPr lang="en-US" dirty="0" smtClean="0"/>
+              <a:t>VDIP</a:t>
+            </a:r>
+          </a:p>
+          <a:p>
+            <a:endParaRPr lang="en-US" dirty="0"/>
+          </a:p>
+        </p:txBody>
+      </p:sp>
+    </p:spTree>
+  </p:cSld>
+  <p:clrMapOvr>
+    <a:masterClrMapping/>
+  </p:clrMapOvr>
+  <p:timing>
+    <p:tnLst>
+      <p:par>
+        <p:cTn id="1" dur="indefinite" restart="never" nodeType="tmRoot"/>
+      </p:par>
+    </p:tnLst>
+  </p:timing>
+</p:sld>
+</file>
+
+<file path=ppt/slides/slide11.xml><?xml version="1.0" encoding="utf-8"?>
+<p:sld xmlns:a="http://schemas.openxmlformats.org/drawingml/2006/main" xmlns:r="http://schemas.openxmlformats.org/officeDocument/2006/relationships" xmlns:p="http://schemas.openxmlformats.org/presentationml/2006/main">
+  <p:cSld>
+    <p:spTree>
+      <p:nvGrpSpPr>
+        <p:cNvPr id="1" name=""/>
+        <p:cNvGrpSpPr/>
+        <p:nvPr/>
+      </p:nvGrpSpPr>
+      <p:grpSpPr>
+        <a:xfrm>
+          <a:off x="0" y="0"/>
+          <a:ext cx="0" cy="0"/>
+          <a:chOff x="0" y="0"/>
+          <a:chExt cx="0" cy="0"/>
+        </a:xfrm>
+      </p:grpSpPr>
+      <p:sp>
+        <p:nvSpPr>
+          <p:cNvPr id="2" name="Title 1"/>
+          <p:cNvSpPr>
+            <a:spLocks noGrp="1"/>
+          </p:cNvSpPr>
+          <p:nvPr>
+            <p:ph type="title"/>
+          </p:nvPr>
+        </p:nvSpPr>
+        <p:spPr/>
+        <p:txBody>
+          <a:bodyPr/>
+          <a:lstStyle/>
+          <a:p>
+            <a:r>
+              <a:rPr lang="en-US" dirty="0" smtClean="0"/>
+              <a:t>The Software</a:t>
+            </a:r>
+            <a:endParaRPr lang="en-US" dirty="0"/>
+          </a:p>
+        </p:txBody>
+      </p:sp>
+      <p:sp>
+        <p:nvSpPr>
+          <p:cNvPr id="3" name="Content Placeholder 2"/>
+          <p:cNvSpPr>
+            <a:spLocks noGrp="1"/>
+          </p:cNvSpPr>
+          <p:nvPr>
+            <p:ph idx="1"/>
+          </p:nvPr>
+        </p:nvSpPr>
+        <p:spPr/>
+        <p:txBody>
+          <a:bodyPr/>
+          <a:lstStyle/>
+          <a:p>
+            <a:endParaRPr lang="en-US" dirty="0"/>
+          </a:p>
+        </p:txBody>
+      </p:sp>
+    </p:spTree>
+  </p:cSld>
+  <p:clrMapOvr>
+    <a:masterClrMapping/>
+  </p:clrMapOvr>
+  <p:timing>
+    <p:tnLst>
+      <p:par>
+        <p:cTn id="1" dur="indefinite" restart="never" nodeType="tmRoot"/>
+      </p:par>
+    </p:tnLst>
+  </p:timing>
+</p:sld>
+</file>
+
+<file path=ppt/slides/slide12.xml><?xml version="1.0" encoding="utf-8"?>
+<p:sld xmlns:a="http://schemas.openxmlformats.org/drawingml/2006/main" xmlns:r="http://schemas.openxmlformats.org/officeDocument/2006/relationships" xmlns:p="http://schemas.openxmlformats.org/presentationml/2006/main">
+  <p:cSld>
+    <p:spTree>
+      <p:nvGrpSpPr>
+        <p:cNvPr id="1" name=""/>
+        <p:cNvGrpSpPr/>
+        <p:nvPr/>
+      </p:nvGrpSpPr>
+      <p:grpSpPr>
+        <a:xfrm>
+          <a:off x="0" y="0"/>
+          <a:ext cx="0" cy="0"/>
+          <a:chOff x="0" y="0"/>
+          <a:chExt cx="0" cy="0"/>
+        </a:xfrm>
+      </p:grpSpPr>
+      <p:sp>
+        <p:nvSpPr>
+          <p:cNvPr id="2" name="Title 1"/>
+          <p:cNvSpPr>
+            <a:spLocks noGrp="1"/>
+          </p:cNvSpPr>
+          <p:nvPr>
+            <p:ph type="title"/>
+          </p:nvPr>
+        </p:nvSpPr>
+        <p:spPr/>
+        <p:txBody>
+          <a:bodyPr/>
+          <a:lstStyle/>
+          <a:p>
+            <a:r>
+              <a:rPr lang="en-US" dirty="0" smtClean="0"/>
+              <a:t>Moving Forward</a:t>
+            </a:r>
+            <a:endParaRPr lang="en-US" dirty="0"/>
+          </a:p>
+        </p:txBody>
+      </p:sp>
+      <p:sp>
+        <p:nvSpPr>
+          <p:cNvPr id="3" name="Content Placeholder 2"/>
+          <p:cNvSpPr>
+            <a:spLocks noGrp="1"/>
+          </p:cNvSpPr>
+          <p:nvPr>
+            <p:ph idx="1"/>
+          </p:nvPr>
+        </p:nvSpPr>
+        <p:spPr/>
+        <p:txBody>
+          <a:bodyPr/>
+          <a:lstStyle/>
+          <a:p>
+            <a:endParaRPr lang="en-US"/>
+          </a:p>
+        </p:txBody>
+      </p:sp>
+    </p:spTree>
+  </p:cSld>
+  <p:clrMapOvr>
+    <a:masterClrMapping/>
+  </p:clrMapOvr>
+  <p:timing>
+    <p:tnLst>
+      <p:par>
+        <p:cTn id="1" dur="indefinite" restart="never" nodeType="tmRoot"/>
+      </p:par>
+    </p:tnLst>
+  </p:timing>
 </p:sld>
 </file>
 
@@ -3432,6 +3686,13 @@
   <p:clrMapOvr>
     <a:masterClrMapping/>
   </p:clrMapOvr>
+  <p:timing>
+    <p:tnLst>
+      <p:par>
+        <p:cTn id="1" dur="indefinite" restart="never" nodeType="tmRoot"/>
+      </p:par>
+    </p:tnLst>
+  </p:timing>
 </p:sld>
 </file>
 
@@ -3469,7 +3730,7 @@
           <a:p>
             <a:r>
               <a:rPr lang="en-US" dirty="0" smtClean="0"/>
-              <a:t>Regular Use</a:t>
+              <a:t>Pairing</a:t>
             </a:r>
             <a:endParaRPr lang="en-US" dirty="0"/>
           </a:p>
@@ -3490,15 +3751,89 @@
           <a:bodyPr/>
           <a:lstStyle/>
           <a:p>
-            <a:endParaRPr lang="en-US"/>
-          </a:p>
-        </p:txBody>
-      </p:sp>
+            <a:pPr>
+              <a:buNone/>
+            </a:pPr>
+            <a:r>
+              <a:rPr lang="en-US" dirty="0" smtClean="0"/>
+              <a:t>Via Bluetooth</a:t>
+            </a:r>
+          </a:p>
+          <a:p>
+            <a:r>
+              <a:rPr lang="en-US" dirty="0" smtClean="0"/>
+              <a:t>Hold down both buttons on the ChapR</a:t>
+            </a:r>
+          </a:p>
+          <a:p>
+            <a:r>
+              <a:rPr lang="en-US" dirty="0" smtClean="0"/>
+              <a:t>Use NXT menus to find the ChapR and connect with it</a:t>
+            </a:r>
+            <a:endParaRPr lang="en-US" dirty="0"/>
+          </a:p>
+        </p:txBody>
+      </p:sp>
+      <p:pic>
+        <p:nvPicPr>
+          <p:cNvPr id="15" name="Picture 14" descr="NXT Select GIF.gif"/>
+          <p:cNvPicPr>
+            <a:picLocks noChangeAspect="1"/>
+          </p:cNvPicPr>
+          <p:nvPr/>
+        </p:nvPicPr>
+        <p:blipFill>
+          <a:blip r:embed="rId2" cstate="print"/>
+          <a:stretch>
+            <a:fillRect/>
+          </a:stretch>
+        </p:blipFill>
+        <p:spPr>
+          <a:xfrm>
+            <a:off x="5638800" y="4267200"/>
+            <a:ext cx="2653805" cy="1819275"/>
+          </a:xfrm>
+          <a:prstGeom prst="rect">
+            <a:avLst/>
+          </a:prstGeom>
+        </p:spPr>
+      </p:pic>
+      <p:pic>
+        <p:nvPicPr>
+          <p:cNvPr id="17" name="Picture 16" descr="Pairing Via BT.gif"/>
+          <p:cNvPicPr>
+            <a:picLocks noChangeAspect="1"/>
+          </p:cNvPicPr>
+          <p:nvPr/>
+        </p:nvPicPr>
+        <p:blipFill>
+          <a:blip r:embed="rId3" cstate="print"/>
+          <a:stretch>
+            <a:fillRect/>
+          </a:stretch>
+        </p:blipFill>
+        <p:spPr>
+          <a:xfrm>
+            <a:off x="304800" y="4495800"/>
+            <a:ext cx="2857500" cy="1905000"/>
+          </a:xfrm>
+          <a:prstGeom prst="rect">
+            <a:avLst/>
+          </a:prstGeom>
+        </p:spPr>
+      </p:pic>
     </p:spTree>
   </p:cSld>
   <p:clrMapOvr>
     <a:masterClrMapping/>
   </p:clrMapOvr>
+  <p:timing>
+    <p:tnLst>
+      <p:par>
+        <p:cTn id="1" dur="indefinite" restart="never" nodeType="tmRoot"/>
+      </p:par>
+    </p:tnLst>
+  </p:timing>
 </p:sld>
 </file>
 
@@ -3536,7 +3871,7 @@
           <a:p>
             <a:r>
               <a:rPr lang="en-US" dirty="0" smtClean="0"/>
-              <a:t>Configurable</a:t>
+              <a:t>Pairing Continued</a:t>
             </a:r>
             <a:endParaRPr lang="en-US" dirty="0"/>
           </a:p>
@@ -3557,42 +3892,65 @@
           <a:bodyPr/>
           <a:lstStyle/>
           <a:p>
+            <a:pPr>
+              <a:buNone/>
+            </a:pPr>
             <a:r>
               <a:rPr lang="en-US" dirty="0" smtClean="0"/>
-              <a:t>Name</a:t>
+              <a:t>Via USB</a:t>
             </a:r>
           </a:p>
           <a:p>
             <a:r>
               <a:rPr lang="en-US" dirty="0" smtClean="0"/>
-              <a:t>Timeout</a:t>
+              <a:t>Make sure Bluetooth is on</a:t>
             </a:r>
           </a:p>
           <a:p>
             <a:r>
               <a:rPr lang="en-US" dirty="0" smtClean="0"/>
-              <a:t>Personality</a:t>
-            </a:r>
-          </a:p>
-          <a:p>
-            <a:r>
-              <a:rPr lang="en-US" dirty="0" smtClean="0"/>
-              <a:t>Mode</a:t>
-            </a:r>
-          </a:p>
-          <a:p>
-            <a:r>
-              <a:rPr lang="en-US" dirty="0" smtClean="0"/>
-              <a:t>Lag</a:t>
-            </a:r>
-          </a:p>
-        </p:txBody>
-      </p:sp>
+              <a:t>Plug in the cable</a:t>
+            </a:r>
+            <a:endParaRPr lang="en-US" dirty="0"/>
+          </a:p>
+        </p:txBody>
+      </p:sp>
+      <p:pic>
+        <p:nvPicPr>
+          <p:cNvPr id="4" name="Picture 3" descr="Powering Up the ChapR.gif"/>
+          <p:cNvPicPr>
+            <a:picLocks noChangeAspect="1"/>
+          </p:cNvPicPr>
+          <p:nvPr/>
+        </p:nvPicPr>
+        <p:blipFill>
+          <a:blip r:embed="rId2" cstate="print"/>
+          <a:stretch>
+            <a:fillRect/>
+          </a:stretch>
+        </p:blipFill>
+        <p:spPr>
+          <a:xfrm>
+            <a:off x="228600" y="4419600"/>
+            <a:ext cx="2857500" cy="1905000"/>
+          </a:xfrm>
+          <a:prstGeom prst="rect">
+            <a:avLst/>
+          </a:prstGeom>
+        </p:spPr>
+      </p:pic>
     </p:spTree>
   </p:cSld>
   <p:clrMapOvr>
     <a:masterClrMapping/>
   </p:clrMapOvr>
+  <p:timing>
+    <p:tnLst>
+      <p:par>
+        <p:cTn id="1" dur="indefinite" restart="never" nodeType="tmRoot"/>
+      </p:par>
+    </p:tnLst>
+  </p:timing>
 </p:sld>
 </file>
 
@@ -3630,28 +3988,116 @@
           <a:p>
             <a:r>
               <a:rPr lang="en-US" dirty="0" smtClean="0"/>
-              <a:t>Programmable</a:t>
+              <a:t>Driving</a:t>
             </a:r>
             <a:endParaRPr lang="en-US" dirty="0"/>
           </a:p>
         </p:txBody>
       </p:sp>
-      <p:sp>
-        <p:nvSpPr>
-          <p:cNvPr id="3" name="Content Placeholder 2"/>
-          <p:cNvSpPr>
-            <a:spLocks noGrp="1"/>
-          </p:cNvSpPr>
+      <p:pic>
+        <p:nvPicPr>
+          <p:cNvPr id="4" name="Content Placeholder 3" descr="v0.3 Case &amp; WFS.jpg"/>
+          <p:cNvPicPr>
+            <a:picLocks noGrp="1" noChangeAspect="1"/>
+          </p:cNvPicPr>
           <p:nvPr>
             <p:ph idx="1"/>
           </p:nvPr>
-        </p:nvSpPr>
-        <p:spPr/>
-        <p:txBody>
-          <a:bodyPr/>
-          <a:lstStyle/>
-          <a:p>
-            <a:endParaRPr lang="en-US"/>
+        </p:nvPicPr>
+        <p:blipFill>
+          <a:blip r:embed="rId2" cstate="print"/>
+          <a:stretch>
+            <a:fillRect/>
+          </a:stretch>
+        </p:blipFill>
+        <p:spPr>
+          <a:xfrm>
+            <a:off x="4724400" y="3429000"/>
+            <a:ext cx="3759200" cy="2819400"/>
+          </a:xfrm>
+        </p:spPr>
+      </p:pic>
+      <p:pic>
+        <p:nvPicPr>
+          <p:cNvPr id="5" name="Picture 4" descr="v0.3 USB (1).jpg"/>
+          <p:cNvPicPr>
+            <a:picLocks noChangeAspect="1"/>
+          </p:cNvPicPr>
+          <p:nvPr/>
+        </p:nvPicPr>
+        <p:blipFill>
+          <a:blip r:embed="rId3" cstate="print"/>
+          <a:stretch>
+            <a:fillRect/>
+          </a:stretch>
+        </p:blipFill>
+        <p:spPr>
+          <a:xfrm>
+            <a:off x="152400" y="1828800"/>
+            <a:ext cx="3733800" cy="2800350"/>
+          </a:xfrm>
+          <a:prstGeom prst="rect">
+            <a:avLst/>
+          </a:prstGeom>
+        </p:spPr>
+      </p:pic>
+      <p:sp>
+        <p:nvSpPr>
+          <p:cNvPr id="6" name="TextBox 5"/>
+          <p:cNvSpPr txBox="1"/>
+          <p:nvPr/>
+        </p:nvSpPr>
+        <p:spPr>
+          <a:xfrm>
+            <a:off x="914400" y="1371600"/>
+            <a:ext cx="1828800" cy="369332"/>
+          </a:xfrm>
+          <a:prstGeom prst="rect">
+            <a:avLst/>
+          </a:prstGeom>
+          <a:noFill/>
+        </p:spPr>
+        <p:txBody>
+          <a:bodyPr wrap="square" rtlCol="0">
+            <a:spAutoFit/>
+          </a:bodyPr>
+          <a:lstStyle/>
+          <a:p>
+            <a:r>
+              <a:rPr lang="en-US" dirty="0" smtClean="0"/>
+              <a:t>Plug in joysticks</a:t>
+            </a:r>
+            <a:endParaRPr lang="en-US" dirty="0"/>
+          </a:p>
+        </p:txBody>
+      </p:sp>
+      <p:sp>
+        <p:nvSpPr>
+          <p:cNvPr id="7" name="TextBox 6"/>
+          <p:cNvSpPr txBox="1"/>
+          <p:nvPr/>
+        </p:nvSpPr>
+        <p:spPr>
+          <a:xfrm>
+            <a:off x="5105400" y="2895600"/>
+            <a:ext cx="3200400" cy="369332"/>
+          </a:xfrm>
+          <a:prstGeom prst="rect">
+            <a:avLst/>
+          </a:prstGeom>
+          <a:noFill/>
+        </p:spPr>
+        <p:txBody>
+          <a:bodyPr wrap="square" rtlCol="0">
+            <a:spAutoFit/>
+          </a:bodyPr>
+          <a:lstStyle/>
+          <a:p>
+            <a:r>
+              <a:rPr lang="en-US" dirty="0" smtClean="0"/>
+              <a:t>Hit the WFS button if needed</a:t>
+            </a:r>
+            <a:endParaRPr lang="en-US" dirty="0"/>
           </a:p>
         </p:txBody>
       </p:sp>
@@ -3660,6 +4106,13 @@
   <p:clrMapOvr>
     <a:masterClrMapping/>
   </p:clrMapOvr>
+  <p:timing>
+    <p:tnLst>
+      <p:par>
+        <p:cTn id="1" dur="indefinite" restart="never" nodeType="tmRoot"/>
+      </p:par>
+    </p:tnLst>
+  </p:timing>
 </p:sld>
 </file>
 
@@ -3697,7 +4150,7 @@
           <a:p>
             <a:r>
               <a:rPr lang="en-US" dirty="0" smtClean="0"/>
-              <a:t>The Hardware</a:t>
+              <a:t>Driving</a:t>
             </a:r>
             <a:endParaRPr lang="en-US" dirty="0"/>
           </a:p>
@@ -3705,28 +4158,70 @@
       </p:sp>
       <p:sp>
         <p:nvSpPr>
-          <p:cNvPr id="3" name="Content Placeholder 2"/>
-          <p:cNvSpPr>
-            <a:spLocks noGrp="1"/>
-          </p:cNvSpPr>
-          <p:nvPr>
-            <p:ph idx="1"/>
-          </p:nvPr>
-        </p:nvSpPr>
-        <p:spPr/>
-        <p:txBody>
-          <a:bodyPr/>
-          <a:lstStyle/>
-          <a:p>
+          <p:cNvPr id="6" name="TextBox 5"/>
+          <p:cNvSpPr txBox="1"/>
+          <p:nvPr/>
+        </p:nvSpPr>
+        <p:spPr>
+          <a:xfrm>
+            <a:off x="304800" y="1371600"/>
+            <a:ext cx="3581400" cy="369332"/>
+          </a:xfrm>
+          <a:prstGeom prst="rect">
+            <a:avLst/>
+          </a:prstGeom>
+          <a:noFill/>
+        </p:spPr>
+        <p:txBody>
+          <a:bodyPr wrap="square" rtlCol="0">
+            <a:spAutoFit/>
+          </a:bodyPr>
+          <a:lstStyle/>
+          <a:p>
+            <a:r>
+              <a:rPr lang="en-US" dirty="0" smtClean="0"/>
+              <a:t>Hit power button to abort program</a:t>
+            </a:r>
             <a:endParaRPr lang="en-US" dirty="0"/>
           </a:p>
         </p:txBody>
       </p:sp>
+      <p:pic>
+        <p:nvPicPr>
+          <p:cNvPr id="8" name="Picture 7" descr="v0.3 Case &amp; PWR.jpg"/>
+          <p:cNvPicPr>
+            <a:picLocks noChangeAspect="1"/>
+          </p:cNvPicPr>
+          <p:nvPr/>
+        </p:nvPicPr>
+        <p:blipFill>
+          <a:blip r:embed="rId2" cstate="print"/>
+          <a:stretch>
+            <a:fillRect/>
+          </a:stretch>
+        </p:blipFill>
+        <p:spPr>
+          <a:xfrm>
+            <a:off x="228600" y="1752600"/>
+            <a:ext cx="3657600" cy="2743200"/>
+          </a:xfrm>
+          <a:prstGeom prst="rect">
+            <a:avLst/>
+          </a:prstGeom>
+        </p:spPr>
+      </p:pic>
     </p:spTree>
   </p:cSld>
   <p:clrMapOvr>
     <a:masterClrMapping/>
   </p:clrMapOvr>
+  <p:timing>
+    <p:tnLst>
+      <p:par>
+        <p:cTn id="1" dur="indefinite" restart="never" nodeType="tmRoot"/>
+      </p:par>
+    </p:tnLst>
+  </p:timing>
 </p:sld>
 </file>
 
@@ -3764,7 +4259,7 @@
           <a:p>
             <a:r>
               <a:rPr lang="en-US" dirty="0" smtClean="0"/>
-              <a:t>The Software</a:t>
+              <a:t>Configurable</a:t>
             </a:r>
             <a:endParaRPr lang="en-US" dirty="0"/>
           </a:p>
@@ -3782,10 +4277,121 @@
         </p:nvSpPr>
         <p:spPr/>
         <p:txBody>
-          <a:bodyPr/>
-          <a:lstStyle/>
-          <a:p>
-            <a:endParaRPr lang="en-US"/>
+          <a:bodyPr>
+            <a:normAutofit fontScale="70000" lnSpcReduction="20000"/>
+          </a:bodyPr>
+          <a:lstStyle/>
+          <a:p>
+            <a:r>
+              <a:rPr lang="en-US" b="1" dirty="0" smtClean="0"/>
+              <a:t>name </a:t>
+            </a:r>
+            <a:r>
+              <a:rPr lang="en-US" dirty="0" smtClean="0"/>
+              <a:t>- the name of the ChapR as viewed by devices searching via Bluetooth (usually the NXT); must be under 15 characters; default is ChapR-whichever number ChapR you could (ex: ChapR-14</a:t>
+            </a:r>
+            <a:r>
+              <a:rPr lang="en-US" dirty="0" smtClean="0"/>
+              <a:t>)</a:t>
+            </a:r>
+            <a:endParaRPr lang="en-US" dirty="0" smtClean="0"/>
+          </a:p>
+          <a:p>
+            <a:r>
+              <a:rPr lang="en-US" b="1" dirty="0" smtClean="0"/>
+              <a:t>personality </a:t>
+            </a:r>
+            <a:r>
+              <a:rPr lang="en-US" dirty="0" smtClean="0"/>
+              <a:t>- the </a:t>
+            </a:r>
+            <a:r>
+              <a:rPr lang="en-US" dirty="0" smtClean="0"/>
+              <a:t>compatibility </a:t>
+            </a:r>
+            <a:r>
+              <a:rPr lang="en-US" dirty="0" smtClean="0"/>
+              <a:t>of the ChapR; default is 1 (NXT-RobotC); click </a:t>
+            </a:r>
+            <a:r>
+              <a:rPr lang="en-US" dirty="0" smtClean="0">
+                <a:hlinkClick r:id="rId2"/>
+              </a:rPr>
+              <a:t>here </a:t>
+            </a:r>
+            <a:r>
+              <a:rPr lang="en-US" dirty="0" smtClean="0"/>
+              <a:t>to view details</a:t>
+            </a:r>
+          </a:p>
+          <a:p>
+            <a:r>
+              <a:rPr lang="en-US" b="1" dirty="0" smtClean="0"/>
+              <a:t>timeout </a:t>
+            </a:r>
+            <a:r>
+              <a:rPr lang="en-US" dirty="0" smtClean="0"/>
+              <a:t>- the time before the ChapR turns itself off to save battery in minutes; 0 means no timeout; 120 minutes is the maximum; default is 10 minutes</a:t>
+            </a:r>
+          </a:p>
+          <a:p>
+            <a:r>
+              <a:rPr lang="en-US" b="1" dirty="0" smtClean="0"/>
+              <a:t>lag </a:t>
+            </a:r>
+            <a:r>
+              <a:rPr lang="en-US" dirty="0" smtClean="0"/>
+              <a:t>- the time between sending messages; lag can be built in to simulate competition-style driving; </a:t>
+            </a:r>
+            <a:r>
+              <a:rPr lang="en-US" dirty="0" smtClean="0"/>
+              <a:t>click </a:t>
+            </a:r>
+            <a:r>
+              <a:rPr lang="en-US" dirty="0" smtClean="0">
+                <a:hlinkClick r:id="rId3"/>
+              </a:rPr>
+              <a:t>here</a:t>
+            </a:r>
+            <a:r>
+              <a:rPr lang="en-US" dirty="0" smtClean="0">
+                <a:hlinkClick r:id="rId3"/>
+              </a:rPr>
+              <a:t> </a:t>
+            </a:r>
+            <a:r>
+              <a:rPr lang="en-US" dirty="0" smtClean="0"/>
+              <a:t>for more information</a:t>
+            </a:r>
+          </a:p>
+          <a:p>
+            <a:r>
+              <a:rPr lang="en-US" b="1" dirty="0" smtClean="0"/>
+              <a:t>mode </a:t>
+            </a:r>
+            <a:r>
+              <a:rPr lang="en-US" dirty="0" smtClean="0"/>
+              <a:t>- </a:t>
+            </a:r>
+            <a:r>
+              <a:rPr lang="en-US" dirty="0" err="1" smtClean="0"/>
+              <a:t>tele</a:t>
+            </a:r>
+            <a:r>
+              <a:rPr lang="en-US" dirty="0" smtClean="0"/>
+              <a:t>-op or autonomous; click </a:t>
+            </a:r>
+            <a:r>
+              <a:rPr lang="en-US" dirty="0" smtClean="0">
+                <a:hlinkClick r:id="rId4"/>
+              </a:rPr>
+              <a:t>here </a:t>
+            </a:r>
+            <a:r>
+              <a:rPr lang="en-US" dirty="0" smtClean="0"/>
+              <a:t>for more detailed information</a:t>
+            </a:r>
+            <a:endParaRPr lang="en-US" dirty="0"/>
           </a:p>
         </p:txBody>
       </p:sp>
@@ -3794,6 +4400,13 @@
   <p:clrMapOvr>
     <a:masterClrMapping/>
   </p:clrMapOvr>
+  <p:timing>
+    <p:tnLst>
+      <p:par>
+        <p:cTn id="1" dur="indefinite" restart="never" nodeType="tmRoot"/>
+      </p:par>
+    </p:tnLst>
+  </p:timing>
 </p:sld>
 </file>
 
@@ -3831,28 +4444,97 @@
           <a:p>
             <a:r>
               <a:rPr lang="en-US" dirty="0" smtClean="0"/>
-              <a:t>Moving Forward</a:t>
+              <a:t>Programmable</a:t>
             </a:r>
             <a:endParaRPr lang="en-US" dirty="0"/>
           </a:p>
         </p:txBody>
       </p:sp>
-      <p:sp>
-        <p:nvSpPr>
-          <p:cNvPr id="3" name="Content Placeholder 2"/>
-          <p:cNvSpPr>
-            <a:spLocks noGrp="1"/>
-          </p:cNvSpPr>
-          <p:nvPr>
-            <p:ph idx="1"/>
-          </p:nvPr>
-        </p:nvSpPr>
-        <p:spPr/>
-        <p:txBody>
-          <a:bodyPr/>
-          <a:lstStyle/>
-          <a:p>
-            <a:endParaRPr lang="en-US"/>
+      <p:pic>
+        <p:nvPicPr>
+          <p:cNvPr id="5123" name="Picture 3"/>
+          <p:cNvPicPr>
+            <a:picLocks noChangeAspect="1" noChangeArrowheads="1"/>
+          </p:cNvPicPr>
+          <p:nvPr/>
+        </p:nvPicPr>
+        <p:blipFill>
+          <a:blip r:embed="rId2" cstate="print"/>
+          <a:srcRect t="3938" r="38720" b="14685"/>
+          <a:stretch>
+            <a:fillRect/>
+          </a:stretch>
+        </p:blipFill>
+        <p:spPr bwMode="auto">
+          <a:xfrm>
+            <a:off x="3993126" y="2971800"/>
+            <a:ext cx="4998474" cy="3733800"/>
+          </a:xfrm>
+          <a:prstGeom prst="rect">
+            <a:avLst/>
+          </a:prstGeom>
+          <a:noFill/>
+          <a:ln w="9525">
+            <a:noFill/>
+            <a:miter lim="800000"/>
+            <a:headEnd/>
+            <a:tailEnd/>
+          </a:ln>
+        </p:spPr>
+      </p:pic>
+      <p:pic>
+        <p:nvPicPr>
+          <p:cNvPr id="5122" name="Picture 2" descr="http://www.weebly.com/uploads/1/9/2/2/19221761/420692394.jpg?107"/>
+          <p:cNvPicPr>
+            <a:picLocks noChangeAspect="1" noChangeArrowheads="1"/>
+          </p:cNvPicPr>
+          <p:nvPr/>
+        </p:nvPicPr>
+        <p:blipFill>
+          <a:blip r:embed="rId3" cstate="print"/>
+          <a:srcRect l="9091" t="9091" r="9091" b="18182"/>
+          <a:stretch>
+            <a:fillRect/>
+          </a:stretch>
+        </p:blipFill>
+        <p:spPr bwMode="auto">
+          <a:xfrm>
+            <a:off x="7060176" y="4800600"/>
+            <a:ext cx="1885950" cy="1676400"/>
+          </a:xfrm>
+          <a:prstGeom prst="rect">
+            <a:avLst/>
+          </a:prstGeom>
+          <a:noFill/>
+        </p:spPr>
+      </p:pic>
+      <p:sp>
+        <p:nvSpPr>
+          <p:cNvPr id="6" name="TextBox 5"/>
+          <p:cNvSpPr txBox="1"/>
+          <p:nvPr/>
+        </p:nvSpPr>
+        <p:spPr>
+          <a:xfrm>
+            <a:off x="457200" y="1676400"/>
+            <a:ext cx="3352800" cy="923330"/>
+          </a:xfrm>
+          <a:prstGeom prst="rect">
+            <a:avLst/>
+          </a:prstGeom>
+          <a:noFill/>
+        </p:spPr>
+        <p:txBody>
+          <a:bodyPr wrap="square" rtlCol="0">
+            <a:spAutoFit/>
+          </a:bodyPr>
+          <a:lstStyle/>
+          <a:p>
+            <a:r>
+              <a:rPr lang="en-US" dirty="0" smtClean="0"/>
+              <a:t>The programmer and code on our website can be used to reprogram the ChapR</a:t>
+            </a:r>
+            <a:endParaRPr lang="en-US" dirty="0"/>
           </a:p>
         </p:txBody>
       </p:sp>
@@ -3861,6 +4543,13 @@
   <p:clrMapOvr>
     <a:masterClrMapping/>
   </p:clrMapOvr>
+  <p:timing>
+    <p:tnLst>
+      <p:par>
+        <p:cTn id="1" dur="indefinite" restart="never" nodeType="tmRoot"/>
+      </p:par>
+    </p:tnLst>
+  </p:timing>
 </p:sld>
 </file>
 

</xml_diff>

<commit_message>
Updated the FTC Presentation and added a picture of the NXT with a USB.
</commit_message>
<xml_diff>
--- a/ChaprSVN/Promo/Presentation for FTC.pptx
+++ b/ChaprSVN/Promo/Presentation for FTC.pptx
@@ -7,16 +7,16 @@
   <p:sldIdLst>
     <p:sldId id="256" r:id="rId2"/>
     <p:sldId id="257" r:id="rId3"/>
-    <p:sldId id="262" r:id="rId4"/>
-    <p:sldId id="266" r:id="rId5"/>
-    <p:sldId id="267" r:id="rId6"/>
-    <p:sldId id="268" r:id="rId7"/>
-    <p:sldId id="269" r:id="rId8"/>
-    <p:sldId id="260" r:id="rId9"/>
-    <p:sldId id="265" r:id="rId10"/>
-    <p:sldId id="261" r:id="rId11"/>
-    <p:sldId id="263" r:id="rId12"/>
-    <p:sldId id="264" r:id="rId13"/>
+    <p:sldId id="271" r:id="rId4"/>
+    <p:sldId id="269" r:id="rId5"/>
+    <p:sldId id="266" r:id="rId6"/>
+    <p:sldId id="267" r:id="rId7"/>
+    <p:sldId id="260" r:id="rId8"/>
+    <p:sldId id="265" r:id="rId9"/>
+    <p:sldId id="261" r:id="rId10"/>
+    <p:sldId id="263" r:id="rId11"/>
+    <p:sldId id="264" r:id="rId12"/>
+    <p:sldId id="272" r:id="rId13"/>
   </p:sldIdLst>
   <p:sldSz cx="9144000" cy="6858000" type="screen4x3"/>
   <p:notesSz cx="6858000" cy="9144000"/>
@@ -300,7 +300,7 @@
             <a:fld id="{2F402DE8-62D5-4C8C-AED6-53CCAA8B3F71}" type="datetimeFigureOut">
               <a:rPr lang="en-US" smtClean="0"/>
               <a:pPr/>
-              <a:t>10/21/2013</a:t>
+              <a:t>10/22/2013</a:t>
             </a:fld>
             <a:endParaRPr lang="en-US"/>
           </a:p>
@@ -467,7 +467,7 @@
             <a:fld id="{2F402DE8-62D5-4C8C-AED6-53CCAA8B3F71}" type="datetimeFigureOut">
               <a:rPr lang="en-US" smtClean="0"/>
               <a:pPr/>
-              <a:t>10/21/2013</a:t>
+              <a:t>10/22/2013</a:t>
             </a:fld>
             <a:endParaRPr lang="en-US"/>
           </a:p>
@@ -644,7 +644,7 @@
             <a:fld id="{2F402DE8-62D5-4C8C-AED6-53CCAA8B3F71}" type="datetimeFigureOut">
               <a:rPr lang="en-US" smtClean="0"/>
               <a:pPr/>
-              <a:t>10/21/2013</a:t>
+              <a:t>10/22/2013</a:t>
             </a:fld>
             <a:endParaRPr lang="en-US"/>
           </a:p>
@@ -811,7 +811,7 @@
             <a:fld id="{2F402DE8-62D5-4C8C-AED6-53CCAA8B3F71}" type="datetimeFigureOut">
               <a:rPr lang="en-US" smtClean="0"/>
               <a:pPr/>
-              <a:t>10/21/2013</a:t>
+              <a:t>10/22/2013</a:t>
             </a:fld>
             <a:endParaRPr lang="en-US"/>
           </a:p>
@@ -1054,7 +1054,7 @@
             <a:fld id="{2F402DE8-62D5-4C8C-AED6-53CCAA8B3F71}" type="datetimeFigureOut">
               <a:rPr lang="en-US" smtClean="0"/>
               <a:pPr/>
-              <a:t>10/21/2013</a:t>
+              <a:t>10/22/2013</a:t>
             </a:fld>
             <a:endParaRPr lang="en-US"/>
           </a:p>
@@ -1339,7 +1339,7 @@
             <a:fld id="{2F402DE8-62D5-4C8C-AED6-53CCAA8B3F71}" type="datetimeFigureOut">
               <a:rPr lang="en-US" smtClean="0"/>
               <a:pPr/>
-              <a:t>10/21/2013</a:t>
+              <a:t>10/22/2013</a:t>
             </a:fld>
             <a:endParaRPr lang="en-US"/>
           </a:p>
@@ -1758,7 +1758,7 @@
             <a:fld id="{2F402DE8-62D5-4C8C-AED6-53CCAA8B3F71}" type="datetimeFigureOut">
               <a:rPr lang="en-US" smtClean="0"/>
               <a:pPr/>
-              <a:t>10/21/2013</a:t>
+              <a:t>10/22/2013</a:t>
             </a:fld>
             <a:endParaRPr lang="en-US"/>
           </a:p>
@@ -1873,7 +1873,7 @@
             <a:fld id="{2F402DE8-62D5-4C8C-AED6-53CCAA8B3F71}" type="datetimeFigureOut">
               <a:rPr lang="en-US" smtClean="0"/>
               <a:pPr/>
-              <a:t>10/21/2013</a:t>
+              <a:t>10/22/2013</a:t>
             </a:fld>
             <a:endParaRPr lang="en-US"/>
           </a:p>
@@ -1965,7 +1965,7 @@
             <a:fld id="{2F402DE8-62D5-4C8C-AED6-53CCAA8B3F71}" type="datetimeFigureOut">
               <a:rPr lang="en-US" smtClean="0"/>
               <a:pPr/>
-              <a:t>10/21/2013</a:t>
+              <a:t>10/22/2013</a:t>
             </a:fld>
             <a:endParaRPr lang="en-US"/>
           </a:p>
@@ -2239,7 +2239,7 @@
             <a:fld id="{2F402DE8-62D5-4C8C-AED6-53CCAA8B3F71}" type="datetimeFigureOut">
               <a:rPr lang="en-US" smtClean="0"/>
               <a:pPr/>
-              <a:t>10/21/2013</a:t>
+              <a:t>10/22/2013</a:t>
             </a:fld>
             <a:endParaRPr lang="en-US"/>
           </a:p>
@@ -2489,7 +2489,7 @@
             <a:fld id="{2F402DE8-62D5-4C8C-AED6-53CCAA8B3F71}" type="datetimeFigureOut">
               <a:rPr lang="en-US" smtClean="0"/>
               <a:pPr/>
-              <a:t>10/21/2013</a:t>
+              <a:t>10/22/2013</a:t>
             </a:fld>
             <a:endParaRPr lang="en-US"/>
           </a:p>
@@ -2699,7 +2699,7 @@
             <a:fld id="{2F402DE8-62D5-4C8C-AED6-53CCAA8B3F71}" type="datetimeFigureOut">
               <a:rPr lang="en-US" smtClean="0"/>
               <a:pPr/>
-              <a:t>10/21/2013</a:t>
+              <a:t>10/22/2013</a:t>
             </a:fld>
             <a:endParaRPr lang="en-US"/>
           </a:p>
@@ -3181,7 +3181,7 @@
           <a:p>
             <a:r>
               <a:rPr lang="en-US" dirty="0" smtClean="0"/>
-              <a:t>The Hardware</a:t>
+              <a:t>The Software</a:t>
             </a:r>
             <a:endParaRPr lang="en-US" dirty="0"/>
           </a:p>
@@ -3197,7 +3197,12 @@
             <p:ph idx="1"/>
           </p:nvPr>
         </p:nvSpPr>
-        <p:spPr/>
+        <p:spPr>
+          <a:xfrm>
+            <a:off x="457200" y="1600201"/>
+            <a:ext cx="8229600" cy="685800"/>
+          </a:xfrm>
+        </p:spPr>
         <p:txBody>
           <a:bodyPr/>
           <a:lstStyle/>
@@ -3208,23 +3213,324 @@
             </a:r>
             <a:r>
               <a:rPr lang="en-US" dirty="0" smtClean="0"/>
-              <a:t> Pro-Mini</a:t>
-            </a:r>
-          </a:p>
-          <a:p>
+              <a:t> Sketch written in C</a:t>
+            </a:r>
+          </a:p>
+          <a:p>
+            <a:endParaRPr lang="en-US" dirty="0"/>
+          </a:p>
+        </p:txBody>
+      </p:sp>
+      <p:sp>
+        <p:nvSpPr>
+          <p:cNvPr id="4" name="Rectangle 3"/>
+          <p:cNvSpPr/>
+          <p:nvPr/>
+        </p:nvSpPr>
+        <p:spPr>
+          <a:xfrm>
+            <a:off x="914400" y="4191000"/>
+            <a:ext cx="1447800" cy="762000"/>
+          </a:xfrm>
+          <a:prstGeom prst="rect">
+            <a:avLst/>
+          </a:prstGeom>
+        </p:spPr>
+        <p:style>
+          <a:lnRef idx="2">
+            <a:schemeClr val="accent1">
+              <a:shade val="50000"/>
+            </a:schemeClr>
+          </a:lnRef>
+          <a:fillRef idx="1">
+            <a:schemeClr val="accent1"/>
+          </a:fillRef>
+          <a:effectRef idx="0">
+            <a:schemeClr val="accent1"/>
+          </a:effectRef>
+          <a:fontRef idx="minor">
+            <a:schemeClr val="lt1"/>
+          </a:fontRef>
+        </p:style>
+        <p:txBody>
+          <a:bodyPr rtlCol="0" anchor="ctr"/>
+          <a:lstStyle/>
+          <a:p>
+            <a:pPr algn="ctr"/>
             <a:r>
               <a:rPr lang="en-US" dirty="0" smtClean="0"/>
-              <a:t>RN-42</a:t>
-            </a:r>
-          </a:p>
-          <a:p>
+              <a:t>Set Up</a:t>
+            </a:r>
+            <a:endParaRPr lang="en-US" dirty="0"/>
+          </a:p>
+        </p:txBody>
+      </p:sp>
+      <p:sp>
+        <p:nvSpPr>
+          <p:cNvPr id="5" name="Rectangle 4"/>
+          <p:cNvSpPr/>
+          <p:nvPr/>
+        </p:nvSpPr>
+        <p:spPr>
+          <a:xfrm>
+            <a:off x="914400" y="3200400"/>
+            <a:ext cx="1447800" cy="762000"/>
+          </a:xfrm>
+          <a:prstGeom prst="rect">
+            <a:avLst/>
+          </a:prstGeom>
+        </p:spPr>
+        <p:style>
+          <a:lnRef idx="2">
+            <a:schemeClr val="accent1">
+              <a:shade val="50000"/>
+            </a:schemeClr>
+          </a:lnRef>
+          <a:fillRef idx="1">
+            <a:schemeClr val="accent1"/>
+          </a:fillRef>
+          <a:effectRef idx="0">
+            <a:schemeClr val="accent1"/>
+          </a:effectRef>
+          <a:fontRef idx="minor">
+            <a:schemeClr val="lt1"/>
+          </a:fontRef>
+        </p:style>
+        <p:txBody>
+          <a:bodyPr rtlCol="0" anchor="ctr"/>
+          <a:lstStyle/>
+          <a:p>
+            <a:pPr algn="ctr"/>
             <a:r>
               <a:rPr lang="en-US" dirty="0" smtClean="0"/>
-              <a:t>VDIP</a:t>
-            </a:r>
-          </a:p>
-          <a:p>
+              <a:t>Power Up</a:t>
+            </a:r>
             <a:endParaRPr lang="en-US" dirty="0"/>
+          </a:p>
+        </p:txBody>
+      </p:sp>
+      <p:sp>
+        <p:nvSpPr>
+          <p:cNvPr id="6" name="Rectangle 5"/>
+          <p:cNvSpPr/>
+          <p:nvPr/>
+        </p:nvSpPr>
+        <p:spPr>
+          <a:xfrm>
+            <a:off x="3810000" y="3048000"/>
+            <a:ext cx="1447800" cy="762000"/>
+          </a:xfrm>
+          <a:prstGeom prst="rect">
+            <a:avLst/>
+          </a:prstGeom>
+        </p:spPr>
+        <p:style>
+          <a:lnRef idx="2">
+            <a:schemeClr val="accent1">
+              <a:shade val="50000"/>
+            </a:schemeClr>
+          </a:lnRef>
+          <a:fillRef idx="1">
+            <a:schemeClr val="accent1"/>
+          </a:fillRef>
+          <a:effectRef idx="0">
+            <a:schemeClr val="accent1"/>
+          </a:effectRef>
+          <a:fontRef idx="minor">
+            <a:schemeClr val="lt1"/>
+          </a:fontRef>
+        </p:style>
+        <p:txBody>
+          <a:bodyPr rtlCol="0" anchor="ctr"/>
+          <a:lstStyle/>
+          <a:p>
+            <a:pPr algn="ctr"/>
+            <a:r>
+              <a:rPr lang="en-US" dirty="0" smtClean="0"/>
+              <a:t>Initialize Bluetooth</a:t>
+            </a:r>
+            <a:endParaRPr lang="en-US" dirty="0"/>
+          </a:p>
+        </p:txBody>
+      </p:sp>
+      <p:sp>
+        <p:nvSpPr>
+          <p:cNvPr id="7" name="Rectangle 6"/>
+          <p:cNvSpPr/>
+          <p:nvPr/>
+        </p:nvSpPr>
+        <p:spPr>
+          <a:xfrm>
+            <a:off x="4038600" y="4038600"/>
+            <a:ext cx="1447800" cy="762000"/>
+          </a:xfrm>
+          <a:prstGeom prst="rect">
+            <a:avLst/>
+          </a:prstGeom>
+        </p:spPr>
+        <p:style>
+          <a:lnRef idx="2">
+            <a:schemeClr val="accent1">
+              <a:shade val="50000"/>
+            </a:schemeClr>
+          </a:lnRef>
+          <a:fillRef idx="1">
+            <a:schemeClr val="accent1"/>
+          </a:fillRef>
+          <a:effectRef idx="0">
+            <a:schemeClr val="accent1"/>
+          </a:effectRef>
+          <a:fontRef idx="minor">
+            <a:schemeClr val="lt1"/>
+          </a:fontRef>
+        </p:style>
+        <p:txBody>
+          <a:bodyPr rtlCol="0" anchor="ctr"/>
+          <a:lstStyle/>
+          <a:p>
+            <a:pPr algn="ctr"/>
+            <a:r>
+              <a:rPr lang="en-US" dirty="0" smtClean="0"/>
+              <a:t>Initialize VDIP</a:t>
+            </a:r>
+            <a:endParaRPr lang="en-US" dirty="0"/>
+          </a:p>
+        </p:txBody>
+      </p:sp>
+      <p:sp>
+        <p:nvSpPr>
+          <p:cNvPr id="8" name="Rectangle 7"/>
+          <p:cNvSpPr/>
+          <p:nvPr/>
+        </p:nvSpPr>
+        <p:spPr>
+          <a:xfrm>
+            <a:off x="3886200" y="5257800"/>
+            <a:ext cx="1447800" cy="762000"/>
+          </a:xfrm>
+          <a:prstGeom prst="rect">
+            <a:avLst/>
+          </a:prstGeom>
+        </p:spPr>
+        <p:style>
+          <a:lnRef idx="2">
+            <a:schemeClr val="accent1">
+              <a:shade val="50000"/>
+            </a:schemeClr>
+          </a:lnRef>
+          <a:fillRef idx="1">
+            <a:schemeClr val="accent1"/>
+          </a:fillRef>
+          <a:effectRef idx="0">
+            <a:schemeClr val="accent1"/>
+          </a:effectRef>
+          <a:fontRef idx="minor">
+            <a:schemeClr val="lt1"/>
+          </a:fontRef>
+        </p:style>
+        <p:txBody>
+          <a:bodyPr rtlCol="0" anchor="ctr"/>
+          <a:lstStyle/>
+          <a:p>
+            <a:pPr algn="ctr"/>
+            <a:r>
+              <a:rPr lang="en-US" dirty="0" smtClean="0"/>
+              <a:t>Read EEPROM</a:t>
+            </a:r>
+            <a:endParaRPr lang="en-US" dirty="0"/>
+          </a:p>
+        </p:txBody>
+      </p:sp>
+      <p:sp>
+        <p:nvSpPr>
+          <p:cNvPr id="9" name="Bent Arrow 8"/>
+          <p:cNvSpPr/>
+          <p:nvPr/>
+        </p:nvSpPr>
+        <p:spPr>
+          <a:xfrm>
+            <a:off x="6248400" y="2819400"/>
+            <a:ext cx="457200" cy="1219200"/>
+          </a:xfrm>
+          <a:prstGeom prst="bentArrow">
+            <a:avLst/>
+          </a:prstGeom>
+        </p:spPr>
+        <p:style>
+          <a:lnRef idx="2">
+            <a:schemeClr val="accent1">
+              <a:shade val="50000"/>
+            </a:schemeClr>
+          </a:lnRef>
+          <a:fillRef idx="1">
+            <a:schemeClr val="accent1"/>
+          </a:fillRef>
+          <a:effectRef idx="0">
+            <a:schemeClr val="accent1"/>
+          </a:effectRef>
+          <a:fontRef idx="minor">
+            <a:schemeClr val="lt1"/>
+          </a:fontRef>
+        </p:style>
+        <p:txBody>
+          <a:bodyPr rtlCol="0" anchor="ctr"/>
+          <a:lstStyle/>
+          <a:p>
+            <a:pPr algn="ctr"/>
+            <a:endParaRPr lang="en-US">
+              <a:solidFill>
+                <a:schemeClr val="tx1"/>
+              </a:solidFill>
+            </a:endParaRPr>
+          </a:p>
+        </p:txBody>
+      </p:sp>
+      <p:sp>
+        <p:nvSpPr>
+          <p:cNvPr id="10" name="Bent Arrow 9"/>
+          <p:cNvSpPr/>
+          <p:nvPr/>
+        </p:nvSpPr>
+        <p:spPr>
+          <a:xfrm rot="10800000">
+            <a:off x="7848600" y="3505200"/>
+            <a:ext cx="457200" cy="1219200"/>
+          </a:xfrm>
+          <a:prstGeom prst="bentArrow">
+            <a:avLst>
+              <a:gd name="adj1" fmla="val 25000"/>
+              <a:gd name="adj2" fmla="val 25000"/>
+              <a:gd name="adj3" fmla="val 25000"/>
+              <a:gd name="adj4" fmla="val 45637"/>
+            </a:avLst>
+          </a:prstGeom>
+        </p:spPr>
+        <p:style>
+          <a:lnRef idx="2">
+            <a:schemeClr val="accent1">
+              <a:shade val="50000"/>
+            </a:schemeClr>
+          </a:lnRef>
+          <a:fillRef idx="1">
+            <a:schemeClr val="accent1"/>
+          </a:fillRef>
+          <a:effectRef idx="0">
+            <a:schemeClr val="accent1"/>
+          </a:effectRef>
+          <a:fontRef idx="minor">
+            <a:schemeClr val="lt1"/>
+          </a:fontRef>
+        </p:style>
+        <p:txBody>
+          <a:bodyPr rtlCol="0" anchor="ctr"/>
+          <a:lstStyle/>
+          <a:p>
+            <a:pPr algn="ctr"/>
+            <a:endParaRPr lang="en-US">
+              <a:solidFill>
+                <a:schemeClr val="tx1"/>
+              </a:solidFill>
+            </a:endParaRPr>
           </a:p>
         </p:txBody>
       </p:sp>
@@ -3277,7 +3583,7 @@
           <a:p>
             <a:r>
               <a:rPr lang="en-US" dirty="0" smtClean="0"/>
-              <a:t>The Software</a:t>
+              <a:t>Moving Forward</a:t>
             </a:r>
             <a:endParaRPr lang="en-US" dirty="0"/>
           </a:p>
@@ -3351,7 +3657,7 @@
           <a:p>
             <a:r>
               <a:rPr lang="en-US" dirty="0" smtClean="0"/>
-              <a:t>Moving Forward</a:t>
+              <a:t>Questions? Feedback?</a:t>
             </a:r>
             <a:endParaRPr lang="en-US" dirty="0"/>
           </a:p>
@@ -3372,7 +3678,29 @@
           <a:bodyPr/>
           <a:lstStyle/>
           <a:p>
-            <a:endParaRPr lang="en-US"/>
+            <a:r>
+              <a:rPr lang="en-US" dirty="0" smtClean="0"/>
+              <a:t>Any ways to spread the word?</a:t>
+            </a:r>
+          </a:p>
+          <a:p>
+            <a:r>
+              <a:rPr lang="en-US" dirty="0" smtClean="0"/>
+              <a:t>Advice for manufacturing or production?</a:t>
+            </a:r>
+          </a:p>
+          <a:p>
+            <a:r>
+              <a:rPr lang="en-US" dirty="0" smtClean="0"/>
+              <a:t>General feedback?</a:t>
+            </a:r>
+          </a:p>
+          <a:p>
+            <a:r>
+              <a:rPr lang="en-US" dirty="0" smtClean="0"/>
+              <a:t>Uses we didn’t think of?</a:t>
+            </a:r>
+            <a:endParaRPr lang="en-US" dirty="0"/>
           </a:p>
         </p:txBody>
       </p:sp>
@@ -3381,13 +3709,6 @@
   <p:clrMapOvr>
     <a:masterClrMapping/>
   </p:clrMapOvr>
-  <p:timing>
-    <p:tnLst>
-      <p:par>
-        <p:cTn id="1" dur="indefinite" restart="never" nodeType="tmRoot"/>
-      </p:par>
-    </p:tnLst>
-  </p:timing>
 </p:sld>
 </file>
 
@@ -3656,28 +3977,179 @@
           <a:p>
             <a:r>
               <a:rPr lang="en-US" dirty="0" smtClean="0"/>
-              <a:t>Features/Demo</a:t>
+              <a:t>Driving</a:t>
             </a:r>
             <a:endParaRPr lang="en-US" dirty="0"/>
           </a:p>
         </p:txBody>
       </p:sp>
-      <p:sp>
-        <p:nvSpPr>
-          <p:cNvPr id="3" name="Content Placeholder 2"/>
-          <p:cNvSpPr>
-            <a:spLocks noGrp="1"/>
-          </p:cNvSpPr>
+      <p:pic>
+        <p:nvPicPr>
+          <p:cNvPr id="5" name="Picture 4" descr="v0.3 USB (1).jpg"/>
+          <p:cNvPicPr>
+            <a:picLocks noChangeAspect="1"/>
+          </p:cNvPicPr>
+          <p:nvPr/>
+        </p:nvPicPr>
+        <p:blipFill>
+          <a:blip r:embed="rId2" cstate="print"/>
+          <a:srcRect l="17500" b="13333"/>
+          <a:stretch>
+            <a:fillRect/>
+          </a:stretch>
+        </p:blipFill>
+        <p:spPr>
+          <a:xfrm>
+            <a:off x="304800" y="1447800"/>
+            <a:ext cx="2514600" cy="1981200"/>
+          </a:xfrm>
+          <a:prstGeom prst="rect">
+            <a:avLst/>
+          </a:prstGeom>
+        </p:spPr>
+      </p:pic>
+      <p:sp>
+        <p:nvSpPr>
+          <p:cNvPr id="6" name="TextBox 5"/>
+          <p:cNvSpPr txBox="1"/>
+          <p:nvPr/>
+        </p:nvSpPr>
+        <p:spPr>
+          <a:xfrm>
+            <a:off x="228600" y="1143000"/>
+            <a:ext cx="1828800" cy="369332"/>
+          </a:xfrm>
+          <a:prstGeom prst="rect">
+            <a:avLst/>
+          </a:prstGeom>
+          <a:noFill/>
+        </p:spPr>
+        <p:txBody>
+          <a:bodyPr wrap="square" rtlCol="0">
+            <a:spAutoFit/>
+          </a:bodyPr>
+          <a:lstStyle/>
+          <a:p>
+            <a:r>
+              <a:rPr lang="en-US" dirty="0" smtClean="0"/>
+              <a:t>Plug in joysticks</a:t>
+            </a:r>
+            <a:endParaRPr lang="en-US" dirty="0"/>
+          </a:p>
+        </p:txBody>
+      </p:sp>
+      <p:sp>
+        <p:nvSpPr>
+          <p:cNvPr id="7" name="TextBox 6"/>
+          <p:cNvSpPr txBox="1"/>
+          <p:nvPr/>
+        </p:nvSpPr>
+        <p:spPr>
+          <a:xfrm>
+            <a:off x="5715000" y="3581400"/>
+            <a:ext cx="3200400" cy="369332"/>
+          </a:xfrm>
+          <a:prstGeom prst="rect">
+            <a:avLst/>
+          </a:prstGeom>
+          <a:noFill/>
+        </p:spPr>
+        <p:txBody>
+          <a:bodyPr wrap="square" rtlCol="0">
+            <a:spAutoFit/>
+          </a:bodyPr>
+          <a:lstStyle/>
+          <a:p>
+            <a:r>
+              <a:rPr lang="en-US" dirty="0" smtClean="0"/>
+              <a:t>Hit the WFS button if needed</a:t>
+            </a:r>
+            <a:endParaRPr lang="en-US" dirty="0"/>
+          </a:p>
+        </p:txBody>
+      </p:sp>
+      <p:pic>
+        <p:nvPicPr>
+          <p:cNvPr id="8" name="Picture 7" descr="v0.3 Case &amp; PWR.jpg"/>
+          <p:cNvPicPr>
+            <a:picLocks noChangeAspect="1"/>
+          </p:cNvPicPr>
+          <p:nvPr/>
+        </p:nvPicPr>
+        <p:blipFill>
+          <a:blip r:embed="rId3" cstate="print"/>
+          <a:stretch>
+            <a:fillRect/>
+          </a:stretch>
+        </p:blipFill>
+        <p:spPr>
+          <a:xfrm>
+            <a:off x="2057400" y="2590800"/>
+            <a:ext cx="2844800" cy="2133600"/>
+          </a:xfrm>
+          <a:prstGeom prst="rect">
+            <a:avLst/>
+          </a:prstGeom>
+        </p:spPr>
+      </p:pic>
+      <p:pic>
+        <p:nvPicPr>
+          <p:cNvPr id="4" name="Content Placeholder 3" descr="v0.3 Case &amp; WFS.jpg"/>
+          <p:cNvPicPr>
+            <a:picLocks noGrp="1" noChangeAspect="1"/>
+          </p:cNvPicPr>
           <p:nvPr>
             <p:ph idx="1"/>
           </p:nvPr>
-        </p:nvSpPr>
-        <p:spPr/>
-        <p:txBody>
-          <a:bodyPr/>
-          <a:lstStyle/>
-          <a:p>
-            <a:endParaRPr lang="en-US"/>
+        </p:nvPicPr>
+        <p:blipFill>
+          <a:blip r:embed="rId4" cstate="print"/>
+          <a:stretch>
+            <a:fillRect/>
+          </a:stretch>
+        </p:blipFill>
+        <p:spPr>
+          <a:xfrm>
+            <a:off x="5791200" y="3962400"/>
+            <a:ext cx="3048000" cy="2286000"/>
+          </a:xfrm>
+        </p:spPr>
+      </p:pic>
+      <p:sp>
+        <p:nvSpPr>
+          <p:cNvPr id="9" name="TextBox 8"/>
+          <p:cNvSpPr txBox="1"/>
+          <p:nvPr/>
+        </p:nvSpPr>
+        <p:spPr>
+          <a:xfrm>
+            <a:off x="2743200" y="2286000"/>
+            <a:ext cx="2971800" cy="369332"/>
+          </a:xfrm>
+          <a:prstGeom prst="rect">
+            <a:avLst/>
+          </a:prstGeom>
+          <a:noFill/>
+        </p:spPr>
+        <p:txBody>
+          <a:bodyPr wrap="square" rtlCol="0">
+            <a:spAutoFit/>
+          </a:bodyPr>
+          <a:lstStyle/>
+          <a:p>
+            <a:r>
+              <a:rPr lang="en-US" dirty="0" smtClean="0"/>
+              <a:t>Hold </a:t>
+            </a:r>
+            <a:r>
+              <a:rPr lang="en-US" dirty="0" smtClean="0"/>
+              <a:t>power button to </a:t>
+            </a:r>
+            <a:r>
+              <a:rPr lang="en-US" dirty="0" smtClean="0"/>
+              <a:t>turn on</a:t>
+            </a:r>
+            <a:endParaRPr lang="en-US" dirty="0"/>
           </a:p>
         </p:txBody>
       </p:sp>
@@ -3730,7 +4202,7 @@
           <a:p>
             <a:r>
               <a:rPr lang="en-US" dirty="0" smtClean="0"/>
-              <a:t>Pairing</a:t>
+              <a:t>The Kill Switch</a:t>
             </a:r>
             <a:endParaRPr lang="en-US" dirty="0"/>
           </a:p>
@@ -3738,37 +4210,33 @@
       </p:sp>
       <p:sp>
         <p:nvSpPr>
-          <p:cNvPr id="3" name="Content Placeholder 2"/>
-          <p:cNvSpPr>
-            <a:spLocks noGrp="1"/>
-          </p:cNvSpPr>
-          <p:nvPr>
-            <p:ph idx="1"/>
-          </p:nvPr>
-        </p:nvSpPr>
-        <p:spPr/>
-        <p:txBody>
-          <a:bodyPr/>
-          <a:lstStyle/>
-          <a:p>
-            <a:pPr>
-              <a:buNone/>
-            </a:pPr>
+          <p:cNvPr id="6" name="TextBox 5"/>
+          <p:cNvSpPr txBox="1"/>
+          <p:nvPr/>
+        </p:nvSpPr>
+        <p:spPr>
+          <a:xfrm>
+            <a:off x="304800" y="1371600"/>
+            <a:ext cx="3581400" cy="369332"/>
+          </a:xfrm>
+          <a:prstGeom prst="rect">
+            <a:avLst/>
+          </a:prstGeom>
+          <a:noFill/>
+        </p:spPr>
+        <p:txBody>
+          <a:bodyPr wrap="square" rtlCol="0">
+            <a:spAutoFit/>
+          </a:bodyPr>
+          <a:lstStyle/>
+          <a:p>
             <a:r>
               <a:rPr lang="en-US" dirty="0" smtClean="0"/>
-              <a:t>Via Bluetooth</a:t>
-            </a:r>
-          </a:p>
-          <a:p>
+              <a:t>Tap </a:t>
+            </a:r>
             <a:r>
               <a:rPr lang="en-US" dirty="0" smtClean="0"/>
-              <a:t>Hold down both buttons on the ChapR</a:t>
-            </a:r>
-          </a:p>
-          <a:p>
-            <a:r>
-              <a:rPr lang="en-US" dirty="0" smtClean="0"/>
-              <a:t>Use NXT menus to find the ChapR and connect with it</a:t>
+              <a:t>power button to abort program</a:t>
             </a:r>
             <a:endParaRPr lang="en-US" dirty="0"/>
           </a:p>
@@ -3776,7 +4244,7 @@
       </p:sp>
       <p:pic>
         <p:nvPicPr>
-          <p:cNvPr id="15" name="Picture 14" descr="NXT Select GIF.gif"/>
+          <p:cNvPr id="8" name="Picture 7" descr="v0.3 Case &amp; PWR.jpg"/>
           <p:cNvPicPr>
             <a:picLocks noChangeAspect="1"/>
           </p:cNvPicPr>
@@ -3790,8 +4258,8 @@
         </p:blipFill>
         <p:spPr>
           <a:xfrm>
-            <a:off x="5638800" y="4267200"/>
-            <a:ext cx="2653805" cy="1819275"/>
+            <a:off x="228600" y="1752600"/>
+            <a:ext cx="3657600" cy="2743200"/>
           </a:xfrm>
           <a:prstGeom prst="rect">
             <a:avLst/>
@@ -3800,28 +4268,157 @@
       </p:pic>
       <p:pic>
         <p:nvPicPr>
-          <p:cNvPr id="17" name="Picture 16" descr="Pairing Via BT.gif"/>
+          <p:cNvPr id="7" name="Picture 6" descr="v0.3 Case &amp; PWR.jpg"/>
           <p:cNvPicPr>
             <a:picLocks noChangeAspect="1"/>
           </p:cNvPicPr>
           <p:nvPr/>
         </p:nvPicPr>
         <p:blipFill>
-          <a:blip r:embed="rId3" cstate="print"/>
+          <a:blip r:embed="rId2" cstate="print"/>
           <a:stretch>
             <a:fillRect/>
           </a:stretch>
         </p:blipFill>
         <p:spPr>
           <a:xfrm>
-            <a:off x="304800" y="4495800"/>
-            <a:ext cx="2857500" cy="1905000"/>
+            <a:off x="4800600" y="3581400"/>
+            <a:ext cx="3657600" cy="2743200"/>
           </a:xfrm>
           <a:prstGeom prst="rect">
             <a:avLst/>
           </a:prstGeom>
         </p:spPr>
       </p:pic>
+      <p:sp>
+        <p:nvSpPr>
+          <p:cNvPr id="9" name="Explosion 1 8"/>
+          <p:cNvSpPr/>
+          <p:nvPr/>
+        </p:nvSpPr>
+        <p:spPr>
+          <a:xfrm>
+            <a:off x="838200" y="2438400"/>
+            <a:ext cx="838200" cy="533400"/>
+          </a:xfrm>
+          <a:prstGeom prst="irregularSeal1">
+            <a:avLst/>
+          </a:prstGeom>
+        </p:spPr>
+        <p:style>
+          <a:lnRef idx="2">
+            <a:schemeClr val="accent1">
+              <a:shade val="50000"/>
+            </a:schemeClr>
+          </a:lnRef>
+          <a:fillRef idx="1">
+            <a:schemeClr val="accent1"/>
+          </a:fillRef>
+          <a:effectRef idx="0">
+            <a:schemeClr val="accent1"/>
+          </a:effectRef>
+          <a:fontRef idx="minor">
+            <a:schemeClr val="lt1"/>
+          </a:fontRef>
+        </p:style>
+        <p:txBody>
+          <a:bodyPr rtlCol="0" anchor="ctr"/>
+          <a:lstStyle/>
+          <a:p>
+            <a:pPr algn="ctr"/>
+            <a:r>
+              <a:rPr lang="en-US" sz="1400" dirty="0" smtClean="0"/>
+              <a:t>TAP</a:t>
+            </a:r>
+            <a:endParaRPr lang="en-US" sz="1400" dirty="0"/>
+          </a:p>
+        </p:txBody>
+      </p:sp>
+      <p:sp>
+        <p:nvSpPr>
+          <p:cNvPr id="10" name="Wave 9"/>
+          <p:cNvSpPr/>
+          <p:nvPr/>
+        </p:nvSpPr>
+        <p:spPr>
+          <a:xfrm>
+            <a:off x="5334000" y="4191000"/>
+            <a:ext cx="838200" cy="533400"/>
+          </a:xfrm>
+          <a:prstGeom prst="wave">
+            <a:avLst>
+              <a:gd name="adj1" fmla="val 12500"/>
+              <a:gd name="adj2" fmla="val 1282"/>
+            </a:avLst>
+          </a:prstGeom>
+        </p:spPr>
+        <p:style>
+          <a:lnRef idx="2">
+            <a:schemeClr val="accent1">
+              <a:shade val="50000"/>
+            </a:schemeClr>
+          </a:lnRef>
+          <a:fillRef idx="1">
+            <a:schemeClr val="accent1"/>
+          </a:fillRef>
+          <a:effectRef idx="0">
+            <a:schemeClr val="accent1"/>
+          </a:effectRef>
+          <a:fontRef idx="minor">
+            <a:schemeClr val="lt1"/>
+          </a:fontRef>
+        </p:style>
+        <p:txBody>
+          <a:bodyPr rtlCol="0" anchor="ctr"/>
+          <a:lstStyle/>
+          <a:p>
+            <a:pPr algn="ctr"/>
+            <a:r>
+              <a:rPr lang="en-US" sz="1400" dirty="0" smtClean="0"/>
+              <a:t>HOLD</a:t>
+            </a:r>
+            <a:endParaRPr lang="en-US" sz="1400" dirty="0"/>
+          </a:p>
+        </p:txBody>
+      </p:sp>
+      <p:sp>
+        <p:nvSpPr>
+          <p:cNvPr id="12" name="TextBox 11"/>
+          <p:cNvSpPr txBox="1"/>
+          <p:nvPr/>
+        </p:nvSpPr>
+        <p:spPr>
+          <a:xfrm>
+            <a:off x="4724400" y="3200400"/>
+            <a:ext cx="3810000" cy="369332"/>
+          </a:xfrm>
+          <a:prstGeom prst="rect">
+            <a:avLst/>
+          </a:prstGeom>
+          <a:noFill/>
+        </p:spPr>
+        <p:txBody>
+          <a:bodyPr wrap="square" rtlCol="0">
+            <a:spAutoFit/>
+          </a:bodyPr>
+          <a:lstStyle/>
+          <a:p>
+            <a:r>
+              <a:rPr lang="en-US" dirty="0" smtClean="0"/>
+              <a:t>Hold </a:t>
+            </a:r>
+            <a:r>
+              <a:rPr lang="en-US" dirty="0" smtClean="0"/>
+              <a:t>power button </a:t>
+            </a:r>
+            <a:r>
+              <a:rPr lang="en-US" dirty="0" smtClean="0"/>
+              <a:t>to turn off ChapR</a:t>
+            </a:r>
+            <a:endParaRPr lang="en-US" dirty="0"/>
+          </a:p>
+        </p:txBody>
+      </p:sp>
     </p:spTree>
   </p:cSld>
   <p:clrMapOvr>
@@ -3871,7 +4468,7 @@
           <a:p>
             <a:r>
               <a:rPr lang="en-US" dirty="0" smtClean="0"/>
-              <a:t>Pairing Continued</a:t>
+              <a:t>Pairing</a:t>
             </a:r>
             <a:endParaRPr lang="en-US" dirty="0"/>
           </a:p>
@@ -3897,19 +4494,19 @@
             </a:pPr>
             <a:r>
               <a:rPr lang="en-US" dirty="0" smtClean="0"/>
-              <a:t>Via USB</a:t>
+              <a:t>Via Bluetooth</a:t>
             </a:r>
           </a:p>
           <a:p>
             <a:r>
               <a:rPr lang="en-US" dirty="0" smtClean="0"/>
-              <a:t>Make sure Bluetooth is on</a:t>
+              <a:t>Hold down both buttons on the ChapR</a:t>
             </a:r>
           </a:p>
           <a:p>
             <a:r>
               <a:rPr lang="en-US" dirty="0" smtClean="0"/>
-              <a:t>Plug in the cable</a:t>
+              <a:t>Use NXT menus to find the ChapR and connect with it</a:t>
             </a:r>
             <a:endParaRPr lang="en-US" dirty="0"/>
           </a:p>
@@ -3917,7 +4514,7 @@
       </p:sp>
       <p:pic>
         <p:nvPicPr>
-          <p:cNvPr id="4" name="Picture 3" descr="Powering Up the ChapR.gif"/>
+          <p:cNvPr id="15" name="Picture 14" descr="NXT Select GIF.gif"/>
           <p:cNvPicPr>
             <a:picLocks noChangeAspect="1"/>
           </p:cNvPicPr>
@@ -3931,7 +4528,31 @@
         </p:blipFill>
         <p:spPr>
           <a:xfrm>
-            <a:off x="228600" y="4419600"/>
+            <a:off x="5638800" y="4267200"/>
+            <a:ext cx="2653805" cy="1819275"/>
+          </a:xfrm>
+          <a:prstGeom prst="rect">
+            <a:avLst/>
+          </a:prstGeom>
+        </p:spPr>
+      </p:pic>
+      <p:pic>
+        <p:nvPicPr>
+          <p:cNvPr id="17" name="Picture 16" descr="Pairing Via BT.gif"/>
+          <p:cNvPicPr>
+            <a:picLocks noChangeAspect="1"/>
+          </p:cNvPicPr>
+          <p:nvPr/>
+        </p:nvPicPr>
+        <p:blipFill>
+          <a:blip r:embed="rId3" cstate="print"/>
+          <a:stretch>
+            <a:fillRect/>
+          </a:stretch>
+        </p:blipFill>
+        <p:spPr>
+          <a:xfrm>
+            <a:off x="304800" y="4495800"/>
             <a:ext cx="2857500" cy="1905000"/>
           </a:xfrm>
           <a:prstGeom prst="rect">
@@ -3988,7 +4609,45 @@
           <a:p>
             <a:r>
               <a:rPr lang="en-US" dirty="0" smtClean="0"/>
-              <a:t>Driving</a:t>
+              <a:t>Pairing Continued</a:t>
+            </a:r>
+            <a:endParaRPr lang="en-US" dirty="0"/>
+          </a:p>
+        </p:txBody>
+      </p:sp>
+      <p:sp>
+        <p:nvSpPr>
+          <p:cNvPr id="3" name="Content Placeholder 2"/>
+          <p:cNvSpPr>
+            <a:spLocks noGrp="1"/>
+          </p:cNvSpPr>
+          <p:nvPr>
+            <p:ph idx="1"/>
+          </p:nvPr>
+        </p:nvSpPr>
+        <p:spPr/>
+        <p:txBody>
+          <a:bodyPr/>
+          <a:lstStyle/>
+          <a:p>
+            <a:pPr>
+              <a:buNone/>
+            </a:pPr>
+            <a:r>
+              <a:rPr lang="en-US" dirty="0" smtClean="0"/>
+              <a:t>Via USB</a:t>
+            </a:r>
+          </a:p>
+          <a:p>
+            <a:r>
+              <a:rPr lang="en-US" dirty="0" smtClean="0"/>
+              <a:t>Make sure Bluetooth is on</a:t>
+            </a:r>
+          </a:p>
+          <a:p>
+            <a:r>
+              <a:rPr lang="en-US" dirty="0" smtClean="0"/>
+              <a:t>Plug in the cable</a:t>
             </a:r>
             <a:endParaRPr lang="en-US" dirty="0"/>
           </a:p>
@@ -3996,13 +4655,11 @@
       </p:sp>
       <p:pic>
         <p:nvPicPr>
-          <p:cNvPr id="4" name="Content Placeholder 3" descr="v0.3 Case &amp; WFS.jpg"/>
+          <p:cNvPr id="4" name="Picture 3" descr="Powering Up the ChapR.gif"/>
           <p:cNvPicPr>
-            <a:picLocks noGrp="1" noChangeAspect="1"/>
+            <a:picLocks noChangeAspect="1"/>
           </p:cNvPicPr>
-          <p:nvPr>
-            <p:ph idx="1"/>
-          </p:nvPr>
+          <p:nvPr/>
         </p:nvPicPr>
         <p:blipFill>
           <a:blip r:embed="rId2" cstate="print"/>
@@ -4012,95 +4669,42 @@
         </p:blipFill>
         <p:spPr>
           <a:xfrm>
-            <a:off x="4724400" y="3429000"/>
-            <a:ext cx="3759200" cy="2819400"/>
-          </a:xfrm>
+            <a:off x="228600" y="4419600"/>
+            <a:ext cx="2857500" cy="1905000"/>
+          </a:xfrm>
+          <a:prstGeom prst="rect">
+            <a:avLst/>
+          </a:prstGeom>
         </p:spPr>
       </p:pic>
       <p:pic>
         <p:nvPicPr>
-          <p:cNvPr id="5" name="Picture 4" descr="v0.3 USB (1).jpg"/>
+          <p:cNvPr id="1026" name="Picture 2" descr="C:\Users\Rachel\Downloads\photo (7).JPG"/>
           <p:cNvPicPr>
-            <a:picLocks noChangeAspect="1"/>
+            <a:picLocks noChangeAspect="1" noChangeArrowheads="1"/>
           </p:cNvPicPr>
           <p:nvPr/>
         </p:nvPicPr>
         <p:blipFill>
-          <a:blip r:embed="rId3" cstate="print"/>
+          <a:blip r:embed="rId3" cstate="print">
+            <a:lum bright="10000" contrast="10000"/>
+          </a:blip>
+          <a:srcRect l="7627"/>
           <a:stretch>
             <a:fillRect/>
           </a:stretch>
         </p:blipFill>
-        <p:spPr>
-          <a:xfrm>
-            <a:off x="152400" y="1828800"/>
-            <a:ext cx="3733800" cy="2800350"/>
-          </a:xfrm>
-          <a:prstGeom prst="rect">
-            <a:avLst/>
-          </a:prstGeom>
-        </p:spPr>
-      </p:pic>
-      <p:sp>
-        <p:nvSpPr>
-          <p:cNvPr id="6" name="TextBox 5"/>
-          <p:cNvSpPr txBox="1"/>
-          <p:nvPr/>
-        </p:nvSpPr>
-        <p:spPr>
-          <a:xfrm>
-            <a:off x="914400" y="1371600"/>
-            <a:ext cx="1828800" cy="369332"/>
+        <p:spPr bwMode="auto">
+          <a:xfrm>
+            <a:off x="4800600" y="3276600"/>
+            <a:ext cx="3860800" cy="3134686"/>
           </a:xfrm>
           <a:prstGeom prst="rect">
             <a:avLst/>
           </a:prstGeom>
           <a:noFill/>
         </p:spPr>
-        <p:txBody>
-          <a:bodyPr wrap="square" rtlCol="0">
-            <a:spAutoFit/>
-          </a:bodyPr>
-          <a:lstStyle/>
-          <a:p>
-            <a:r>
-              <a:rPr lang="en-US" dirty="0" smtClean="0"/>
-              <a:t>Plug in joysticks</a:t>
-            </a:r>
-            <a:endParaRPr lang="en-US" dirty="0"/>
-          </a:p>
-        </p:txBody>
-      </p:sp>
-      <p:sp>
-        <p:nvSpPr>
-          <p:cNvPr id="7" name="TextBox 6"/>
-          <p:cNvSpPr txBox="1"/>
-          <p:nvPr/>
-        </p:nvSpPr>
-        <p:spPr>
-          <a:xfrm>
-            <a:off x="5105400" y="2895600"/>
-            <a:ext cx="3200400" cy="369332"/>
-          </a:xfrm>
-          <a:prstGeom prst="rect">
-            <a:avLst/>
-          </a:prstGeom>
-          <a:noFill/>
-        </p:spPr>
-        <p:txBody>
-          <a:bodyPr wrap="square" rtlCol="0">
-            <a:spAutoFit/>
-          </a:bodyPr>
-          <a:lstStyle/>
-          <a:p>
-            <a:r>
-              <a:rPr lang="en-US" dirty="0" smtClean="0"/>
-              <a:t>Hit the WFS button if needed</a:t>
-            </a:r>
-            <a:endParaRPr lang="en-US" dirty="0"/>
-          </a:p>
-        </p:txBody>
-      </p:sp>
+      </p:pic>
     </p:spTree>
   </p:cSld>
   <p:clrMapOvr>
@@ -4150,7 +4754,7 @@
           <a:p>
             <a:r>
               <a:rPr lang="en-US" dirty="0" smtClean="0"/>
-              <a:t>Driving</a:t>
+              <a:t>Configurable</a:t>
             </a:r>
             <a:endParaRPr lang="en-US" dirty="0"/>
           </a:p>
@@ -4158,58 +4762,98 @@
       </p:sp>
       <p:sp>
         <p:nvSpPr>
-          <p:cNvPr id="6" name="TextBox 5"/>
-          <p:cNvSpPr txBox="1"/>
-          <p:nvPr/>
-        </p:nvSpPr>
-        <p:spPr>
-          <a:xfrm>
-            <a:off x="304800" y="1371600"/>
-            <a:ext cx="3581400" cy="369332"/>
-          </a:xfrm>
-          <a:prstGeom prst="rect">
-            <a:avLst/>
-          </a:prstGeom>
-          <a:noFill/>
-        </p:spPr>
-        <p:txBody>
-          <a:bodyPr wrap="square" rtlCol="0">
-            <a:spAutoFit/>
+          <p:cNvPr id="3" name="Content Placeholder 2"/>
+          <p:cNvSpPr>
+            <a:spLocks noGrp="1"/>
+          </p:cNvSpPr>
+          <p:nvPr>
+            <p:ph idx="1"/>
+          </p:nvPr>
+        </p:nvSpPr>
+        <p:spPr/>
+        <p:txBody>
+          <a:bodyPr>
+            <a:normAutofit fontScale="85000" lnSpcReduction="20000"/>
           </a:bodyPr>
           <a:lstStyle/>
           <a:p>
             <a:r>
+              <a:rPr lang="en-US" b="1" dirty="0" smtClean="0"/>
+              <a:t>name </a:t>
+            </a:r>
+            <a:r>
               <a:rPr lang="en-US" dirty="0" smtClean="0"/>
-              <a:t>Hit power button to abort program</a:t>
+              <a:t>- the name of the ChapR as viewed by devices searching via Bluetooth (usually the NXT); must be under 15 characters; default is ChapR-whichever number ChapR you could (ex: ChapR-14)</a:t>
+            </a:r>
+          </a:p>
+          <a:p>
+            <a:r>
+              <a:rPr lang="en-US" b="1" dirty="0" smtClean="0"/>
+              <a:t>personality </a:t>
+            </a:r>
+            <a:r>
+              <a:rPr lang="en-US" dirty="0" smtClean="0"/>
+              <a:t>- the compatibility of the ChapR; default is 1 (NXT-RobotC); click </a:t>
+            </a:r>
+            <a:r>
+              <a:rPr lang="en-US" dirty="0" smtClean="0"/>
+              <a:t>here to </a:t>
+            </a:r>
+            <a:r>
+              <a:rPr lang="en-US" dirty="0" smtClean="0"/>
+              <a:t>view details</a:t>
+            </a:r>
+          </a:p>
+          <a:p>
+            <a:r>
+              <a:rPr lang="en-US" b="1" dirty="0" smtClean="0"/>
+              <a:t>timeout </a:t>
+            </a:r>
+            <a:r>
+              <a:rPr lang="en-US" dirty="0" smtClean="0"/>
+              <a:t>- the time before the ChapR turns itself off to save battery in minutes; 0 means no timeout; 120 minutes is the maximum; default is 10 minutes</a:t>
+            </a:r>
+          </a:p>
+          <a:p>
+            <a:r>
+              <a:rPr lang="en-US" b="1" dirty="0" smtClean="0"/>
+              <a:t>lag </a:t>
+            </a:r>
+            <a:r>
+              <a:rPr lang="en-US" dirty="0" smtClean="0"/>
+              <a:t>- the time between sending messages; lag can be built in to simulate competition-style </a:t>
+            </a:r>
+            <a:r>
+              <a:rPr lang="en-US" dirty="0" smtClean="0"/>
+              <a:t>driving</a:t>
+            </a:r>
+            <a:endParaRPr lang="en-US" dirty="0" smtClean="0"/>
+          </a:p>
+          <a:p>
+            <a:r>
+              <a:rPr lang="en-US" b="1" dirty="0" smtClean="0"/>
+              <a:t>mode </a:t>
+            </a:r>
+            <a:r>
+              <a:rPr lang="en-US" dirty="0" smtClean="0"/>
+              <a:t>- </a:t>
+            </a:r>
+            <a:r>
+              <a:rPr lang="en-US" dirty="0" err="1" smtClean="0"/>
+              <a:t>tele</a:t>
+            </a:r>
+            <a:r>
+              <a:rPr lang="en-US" dirty="0" smtClean="0"/>
+              <a:t>-op or </a:t>
+            </a:r>
+            <a:r>
+              <a:rPr lang="en-US" dirty="0" smtClean="0"/>
+              <a:t>autonomous</a:t>
             </a:r>
             <a:endParaRPr lang="en-US" dirty="0"/>
           </a:p>
         </p:txBody>
       </p:sp>
-      <p:pic>
-        <p:nvPicPr>
-          <p:cNvPr id="8" name="Picture 7" descr="v0.3 Case &amp; PWR.jpg"/>
-          <p:cNvPicPr>
-            <a:picLocks noChangeAspect="1"/>
-          </p:cNvPicPr>
-          <p:nvPr/>
-        </p:nvPicPr>
-        <p:blipFill>
-          <a:blip r:embed="rId2" cstate="print"/>
-          <a:stretch>
-            <a:fillRect/>
-          </a:stretch>
-        </p:blipFill>
-        <p:spPr>
-          <a:xfrm>
-            <a:off x="228600" y="1752600"/>
-            <a:ext cx="3657600" cy="2743200"/>
-          </a:xfrm>
-          <a:prstGeom prst="rect">
-            <a:avLst/>
-          </a:prstGeom>
-        </p:spPr>
-      </p:pic>
     </p:spTree>
   </p:cSld>
   <p:clrMapOvr>
@@ -4259,142 +4903,126 @@
           <a:p>
             <a:r>
               <a:rPr lang="en-US" dirty="0" smtClean="0"/>
-              <a:t>Configurable</a:t>
+              <a:t>Programmable</a:t>
             </a:r>
             <a:endParaRPr lang="en-US" dirty="0"/>
           </a:p>
         </p:txBody>
       </p:sp>
-      <p:sp>
-        <p:nvSpPr>
-          <p:cNvPr id="3" name="Content Placeholder 2"/>
-          <p:cNvSpPr>
-            <a:spLocks noGrp="1"/>
-          </p:cNvSpPr>
-          <p:nvPr>
-            <p:ph idx="1"/>
-          </p:nvPr>
-        </p:nvSpPr>
-        <p:spPr/>
-        <p:txBody>
-          <a:bodyPr>
-            <a:normAutofit fontScale="70000" lnSpcReduction="20000"/>
+      <p:pic>
+        <p:nvPicPr>
+          <p:cNvPr id="5123" name="Picture 3"/>
+          <p:cNvPicPr>
+            <a:picLocks noChangeAspect="1" noChangeArrowheads="1"/>
+          </p:cNvPicPr>
+          <p:nvPr/>
+        </p:nvPicPr>
+        <p:blipFill>
+          <a:blip r:embed="rId2" cstate="print"/>
+          <a:srcRect t="3938" r="38720" b="14685"/>
+          <a:stretch>
+            <a:fillRect/>
+          </a:stretch>
+        </p:blipFill>
+        <p:spPr bwMode="auto">
+          <a:xfrm>
+            <a:off x="3993126" y="2971800"/>
+            <a:ext cx="4998474" cy="3733800"/>
+          </a:xfrm>
+          <a:prstGeom prst="rect">
+            <a:avLst/>
+          </a:prstGeom>
+          <a:noFill/>
+          <a:ln w="9525">
+            <a:noFill/>
+            <a:miter lim="800000"/>
+            <a:headEnd/>
+            <a:tailEnd/>
+          </a:ln>
+        </p:spPr>
+      </p:pic>
+      <p:pic>
+        <p:nvPicPr>
+          <p:cNvPr id="5122" name="Picture 2" descr="http://www.weebly.com/uploads/1/9/2/2/19221761/420692394.jpg?107"/>
+          <p:cNvPicPr>
+            <a:picLocks noChangeAspect="1" noChangeArrowheads="1"/>
+          </p:cNvPicPr>
+          <p:nvPr/>
+        </p:nvPicPr>
+        <p:blipFill>
+          <a:blip r:embed="rId3" cstate="print"/>
+          <a:srcRect l="9091" t="9091" r="9091" b="18182"/>
+          <a:stretch>
+            <a:fillRect/>
+          </a:stretch>
+        </p:blipFill>
+        <p:spPr bwMode="auto">
+          <a:xfrm>
+            <a:off x="7145900" y="4876800"/>
+            <a:ext cx="1800225" cy="1600200"/>
+          </a:xfrm>
+          <a:prstGeom prst="rect">
+            <a:avLst/>
+          </a:prstGeom>
+          <a:noFill/>
+        </p:spPr>
+      </p:pic>
+      <p:sp>
+        <p:nvSpPr>
+          <p:cNvPr id="6" name="TextBox 5"/>
+          <p:cNvSpPr txBox="1"/>
+          <p:nvPr/>
+        </p:nvSpPr>
+        <p:spPr>
+          <a:xfrm>
+            <a:off x="457200" y="1676400"/>
+            <a:ext cx="3352800" cy="923330"/>
+          </a:xfrm>
+          <a:prstGeom prst="rect">
+            <a:avLst/>
+          </a:prstGeom>
+          <a:noFill/>
+        </p:spPr>
+        <p:txBody>
+          <a:bodyPr wrap="square" rtlCol="0">
+            <a:spAutoFit/>
           </a:bodyPr>
           <a:lstStyle/>
           <a:p>
             <a:r>
-              <a:rPr lang="en-US" b="1" dirty="0" smtClean="0"/>
-              <a:t>name </a:t>
-            </a:r>
-            <a:r>
               <a:rPr lang="en-US" dirty="0" smtClean="0"/>
-              <a:t>- the name of the ChapR as viewed by devices searching via Bluetooth (usually the NXT); must be under 15 characters; default is ChapR-whichever number ChapR you could (ex: ChapR-14</a:t>
-            </a:r>
-            <a:r>
-              <a:rPr lang="en-US" dirty="0" smtClean="0"/>
-              <a:t>)</a:t>
-            </a:r>
-            <a:endParaRPr lang="en-US" dirty="0" smtClean="0"/>
-          </a:p>
-          <a:p>
-            <a:r>
-              <a:rPr lang="en-US" b="1" dirty="0" smtClean="0"/>
-              <a:t>personality </a:t>
-            </a:r>
-            <a:r>
-              <a:rPr lang="en-US" dirty="0" smtClean="0"/>
-              <a:t>- the </a:t>
-            </a:r>
-            <a:r>
-              <a:rPr lang="en-US" dirty="0" smtClean="0"/>
-              <a:t>compatibility </a:t>
-            </a:r>
-            <a:r>
-              <a:rPr lang="en-US" dirty="0" smtClean="0"/>
-              <a:t>of the ChapR; default is 1 (NXT-RobotC); click </a:t>
-            </a:r>
-            <a:r>
-              <a:rPr lang="en-US" dirty="0" smtClean="0">
-                <a:hlinkClick r:id="rId2"/>
-              </a:rPr>
-              <a:t>here </a:t>
-            </a:r>
-            <a:r>
-              <a:rPr lang="en-US" dirty="0" smtClean="0"/>
-              <a:t>to view details</a:t>
-            </a:r>
-          </a:p>
-          <a:p>
-            <a:r>
-              <a:rPr lang="en-US" b="1" dirty="0" smtClean="0"/>
-              <a:t>timeout </a:t>
-            </a:r>
-            <a:r>
-              <a:rPr lang="en-US" dirty="0" smtClean="0"/>
-              <a:t>- the time before the ChapR turns itself off to save battery in minutes; 0 means no timeout; 120 minutes is the maximum; default is 10 minutes</a:t>
-            </a:r>
-          </a:p>
-          <a:p>
-            <a:r>
-              <a:rPr lang="en-US" b="1" dirty="0" smtClean="0"/>
-              <a:t>lag </a:t>
-            </a:r>
-            <a:r>
-              <a:rPr lang="en-US" dirty="0" smtClean="0"/>
-              <a:t>- the time between sending messages; lag can be built in to simulate competition-style driving; </a:t>
-            </a:r>
-            <a:r>
-              <a:rPr lang="en-US" dirty="0" smtClean="0"/>
-              <a:t>click </a:t>
-            </a:r>
-            <a:r>
-              <a:rPr lang="en-US" dirty="0" smtClean="0">
-                <a:hlinkClick r:id="rId3"/>
-              </a:rPr>
-              <a:t>here</a:t>
-            </a:r>
-            <a:r>
-              <a:rPr lang="en-US" dirty="0" smtClean="0">
-                <a:hlinkClick r:id="rId3"/>
-              </a:rPr>
-              <a:t> </a:t>
-            </a:r>
-            <a:r>
-              <a:rPr lang="en-US" dirty="0" smtClean="0"/>
-              <a:t>for more information</a:t>
-            </a:r>
-          </a:p>
-          <a:p>
-            <a:r>
-              <a:rPr lang="en-US" b="1" dirty="0" smtClean="0"/>
-              <a:t>mode </a:t>
-            </a:r>
-            <a:r>
-              <a:rPr lang="en-US" dirty="0" smtClean="0"/>
-              <a:t>- </a:t>
-            </a:r>
-            <a:r>
-              <a:rPr lang="en-US" dirty="0" err="1" smtClean="0"/>
-              <a:t>tele</a:t>
-            </a:r>
-            <a:r>
-              <a:rPr lang="en-US" dirty="0" smtClean="0"/>
-              <a:t>-op or autonomous; click </a:t>
-            </a:r>
-            <a:r>
-              <a:rPr lang="en-US" dirty="0" smtClean="0">
-                <a:hlinkClick r:id="rId4"/>
-              </a:rPr>
-              <a:t>here </a:t>
-            </a:r>
-            <a:r>
-              <a:rPr lang="en-US" dirty="0" smtClean="0"/>
-              <a:t>for more detailed information</a:t>
+              <a:t>The programmer and code on our website can be used to reprogram the ChapR</a:t>
             </a:r>
             <a:endParaRPr lang="en-US" dirty="0"/>
           </a:p>
         </p:txBody>
       </p:sp>
+      <p:pic>
+        <p:nvPicPr>
+          <p:cNvPr id="6146" name="Picture 2" descr="Picture"/>
+          <p:cNvPicPr>
+            <a:picLocks noChangeAspect="1" noChangeArrowheads="1"/>
+          </p:cNvPicPr>
+          <p:nvPr/>
+        </p:nvPicPr>
+        <p:blipFill>
+          <a:blip r:embed="rId4" cstate="print"/>
+          <a:srcRect/>
+          <a:stretch>
+            <a:fillRect/>
+          </a:stretch>
+        </p:blipFill>
+        <p:spPr bwMode="auto">
+          <a:xfrm>
+            <a:off x="304800" y="3733800"/>
+            <a:ext cx="3286125" cy="2190751"/>
+          </a:xfrm>
+          <a:prstGeom prst="rect">
+            <a:avLst/>
+          </a:prstGeom>
+          <a:noFill/>
+        </p:spPr>
+      </p:pic>
     </p:spTree>
   </p:cSld>
   <p:clrMapOvr>
@@ -4444,80 +5072,309 @@
           <a:p>
             <a:r>
               <a:rPr lang="en-US" dirty="0" smtClean="0"/>
-              <a:t>Programmable</a:t>
+              <a:t>The Hardware</a:t>
             </a:r>
             <a:endParaRPr lang="en-US" dirty="0"/>
+          </a:p>
+        </p:txBody>
+      </p:sp>
+      <p:sp>
+        <p:nvSpPr>
+          <p:cNvPr id="3" name="Content Placeholder 2"/>
+          <p:cNvSpPr>
+            <a:spLocks noGrp="1"/>
+          </p:cNvSpPr>
+          <p:nvPr>
+            <p:ph idx="1"/>
+          </p:nvPr>
+        </p:nvSpPr>
+        <p:spPr>
+          <a:xfrm>
+            <a:off x="533400" y="2743200"/>
+            <a:ext cx="2286000" cy="1371600"/>
+          </a:xfrm>
+        </p:spPr>
+        <p:txBody>
+          <a:bodyPr>
+            <a:normAutofit/>
+          </a:bodyPr>
+          <a:lstStyle/>
+          <a:p>
+            <a:pPr>
+              <a:buNone/>
+            </a:pPr>
+            <a:r>
+              <a:rPr lang="en-US" sz="1800" dirty="0" err="1" smtClean="0"/>
+              <a:t>Arduino</a:t>
+            </a:r>
+            <a:r>
+              <a:rPr lang="en-US" sz="1800" dirty="0" smtClean="0"/>
+              <a:t> </a:t>
+            </a:r>
+            <a:r>
+              <a:rPr lang="en-US" sz="1800" dirty="0" smtClean="0"/>
+              <a:t>Pro-Mini</a:t>
+            </a:r>
+            <a:endParaRPr lang="en-US" sz="1800" dirty="0" smtClean="0"/>
           </a:p>
         </p:txBody>
       </p:sp>
       <p:pic>
         <p:nvPicPr>
-          <p:cNvPr id="5123" name="Picture 3"/>
+          <p:cNvPr id="4" name="Picture 3" descr="v0.3 Board.jpg"/>
           <p:cNvPicPr>
-            <a:picLocks noChangeAspect="1" noChangeArrowheads="1"/>
+            <a:picLocks noChangeAspect="1"/>
           </p:cNvPicPr>
           <p:nvPr/>
         </p:nvPicPr>
         <p:blipFill>
-          <a:blip r:embed="rId2" cstate="print"/>
-          <a:srcRect t="3938" r="38720" b="14685"/>
+          <a:blip r:embed="rId2" cstate="print">
+            <a:lum bright="10000"/>
+          </a:blip>
+          <a:srcRect l="14535" r="24419"/>
           <a:stretch>
             <a:fillRect/>
           </a:stretch>
         </p:blipFill>
-        <p:spPr bwMode="auto">
-          <a:xfrm>
-            <a:off x="3993126" y="2971800"/>
-            <a:ext cx="4998474" cy="3733800"/>
+        <p:spPr>
+          <a:xfrm>
+            <a:off x="3048000" y="2667000"/>
+            <a:ext cx="2667000" cy="3276600"/>
+          </a:xfrm>
+          <a:prstGeom prst="rect">
+            <a:avLst/>
+          </a:prstGeom>
+        </p:spPr>
+      </p:pic>
+      <p:sp>
+        <p:nvSpPr>
+          <p:cNvPr id="5" name="TextBox 4"/>
+          <p:cNvSpPr txBox="1"/>
+          <p:nvPr/>
+        </p:nvSpPr>
+        <p:spPr>
+          <a:xfrm>
+            <a:off x="7162800" y="2057400"/>
+            <a:ext cx="1295400" cy="369332"/>
           </a:xfrm>
           <a:prstGeom prst="rect">
             <a:avLst/>
           </a:prstGeom>
           <a:noFill/>
-          <a:ln w="9525">
-            <a:noFill/>
-            <a:miter lim="800000"/>
-            <a:headEnd/>
-            <a:tailEnd/>
-          </a:ln>
-        </p:spPr>
-      </p:pic>
-      <p:pic>
-        <p:nvPicPr>
-          <p:cNvPr id="5122" name="Picture 2" descr="http://www.weebly.com/uploads/1/9/2/2/19221761/420692394.jpg?107"/>
-          <p:cNvPicPr>
-            <a:picLocks noChangeAspect="1" noChangeArrowheads="1"/>
-          </p:cNvPicPr>
+        </p:spPr>
+        <p:txBody>
+          <a:bodyPr wrap="square" rtlCol="0">
+            <a:spAutoFit/>
+          </a:bodyPr>
+          <a:lstStyle/>
+          <a:p>
+            <a:r>
+              <a:rPr lang="en-US" dirty="0" smtClean="0"/>
+              <a:t>RN-42</a:t>
+            </a:r>
+            <a:endParaRPr lang="en-US" dirty="0"/>
+          </a:p>
+        </p:txBody>
+      </p:sp>
+      <p:sp>
+        <p:nvSpPr>
+          <p:cNvPr id="6" name="TextBox 5"/>
+          <p:cNvSpPr txBox="1"/>
           <p:nvPr/>
-        </p:nvPicPr>
-        <p:blipFill>
-          <a:blip r:embed="rId3" cstate="print"/>
-          <a:srcRect l="9091" t="9091" r="9091" b="18182"/>
-          <a:stretch>
-            <a:fillRect/>
-          </a:stretch>
-        </p:blipFill>
-        <p:spPr bwMode="auto">
-          <a:xfrm>
-            <a:off x="7060176" y="4800600"/>
-            <a:ext cx="1885950" cy="1676400"/>
+        </p:nvSpPr>
+        <p:spPr>
+          <a:xfrm>
+            <a:off x="7010400" y="3733800"/>
+            <a:ext cx="990600" cy="369332"/>
           </a:xfrm>
           <a:prstGeom prst="rect">
             <a:avLst/>
           </a:prstGeom>
           <a:noFill/>
         </p:spPr>
-      </p:pic>
-      <p:sp>
-        <p:nvSpPr>
-          <p:cNvPr id="6" name="TextBox 5"/>
+        <p:txBody>
+          <a:bodyPr wrap="square" rtlCol="0">
+            <a:spAutoFit/>
+          </a:bodyPr>
+          <a:lstStyle/>
+          <a:p>
+            <a:r>
+              <a:rPr lang="en-US" dirty="0" smtClean="0"/>
+              <a:t>VDIP</a:t>
+            </a:r>
+            <a:endParaRPr lang="en-US" dirty="0"/>
+          </a:p>
+        </p:txBody>
+      </p:sp>
+      <p:cxnSp>
+        <p:nvCxnSpPr>
+          <p:cNvPr id="8" name="Straight Arrow Connector 7"/>
+          <p:cNvCxnSpPr/>
+          <p:nvPr/>
+        </p:nvCxnSpPr>
+        <p:spPr>
+          <a:xfrm>
+            <a:off x="2286000" y="2895600"/>
+            <a:ext cx="1981200" cy="1447800"/>
+          </a:xfrm>
+          <a:prstGeom prst="straightConnector1">
+            <a:avLst/>
+          </a:prstGeom>
+          <a:ln w="31750">
+            <a:solidFill>
+              <a:schemeClr val="tx1"/>
+            </a:solidFill>
+            <a:tailEnd type="arrow"/>
+          </a:ln>
+        </p:spPr>
+        <p:style>
+          <a:lnRef idx="1">
+            <a:schemeClr val="accent1"/>
+          </a:lnRef>
+          <a:fillRef idx="0">
+            <a:schemeClr val="accent1"/>
+          </a:fillRef>
+          <a:effectRef idx="0">
+            <a:schemeClr val="accent1"/>
+          </a:effectRef>
+          <a:fontRef idx="minor">
+            <a:schemeClr val="tx1"/>
+          </a:fontRef>
+        </p:style>
+      </p:cxnSp>
+      <p:cxnSp>
+        <p:nvCxnSpPr>
+          <p:cNvPr id="9" name="Straight Arrow Connector 8"/>
+          <p:cNvCxnSpPr/>
+          <p:nvPr/>
+        </p:nvCxnSpPr>
+        <p:spPr>
+          <a:xfrm flipH="1">
+            <a:off x="3962400" y="2438400"/>
+            <a:ext cx="3276600" cy="1219200"/>
+          </a:xfrm>
+          <a:prstGeom prst="straightConnector1">
+            <a:avLst/>
+          </a:prstGeom>
+          <a:ln w="31750">
+            <a:solidFill>
+              <a:schemeClr val="tx1"/>
+            </a:solidFill>
+            <a:tailEnd type="arrow"/>
+          </a:ln>
+        </p:spPr>
+        <p:style>
+          <a:lnRef idx="1">
+            <a:schemeClr val="accent1"/>
+          </a:lnRef>
+          <a:fillRef idx="0">
+            <a:schemeClr val="accent1"/>
+          </a:fillRef>
+          <a:effectRef idx="0">
+            <a:schemeClr val="accent1"/>
+          </a:effectRef>
+          <a:fontRef idx="minor">
+            <a:schemeClr val="tx1"/>
+          </a:fontRef>
+        </p:style>
+      </p:cxnSp>
+      <p:cxnSp>
+        <p:nvCxnSpPr>
+          <p:cNvPr id="12" name="Straight Arrow Connector 11"/>
+          <p:cNvCxnSpPr/>
+          <p:nvPr/>
+        </p:nvCxnSpPr>
+        <p:spPr>
+          <a:xfrm flipH="1">
+            <a:off x="4495800" y="3886200"/>
+            <a:ext cx="2438400" cy="76200"/>
+          </a:xfrm>
+          <a:prstGeom prst="straightConnector1">
+            <a:avLst/>
+          </a:prstGeom>
+          <a:ln w="31750">
+            <a:solidFill>
+              <a:schemeClr val="tx1"/>
+            </a:solidFill>
+            <a:tailEnd type="arrow"/>
+          </a:ln>
+        </p:spPr>
+        <p:style>
+          <a:lnRef idx="1">
+            <a:schemeClr val="accent1"/>
+          </a:lnRef>
+          <a:fillRef idx="0">
+            <a:schemeClr val="accent1"/>
+          </a:fillRef>
+          <a:effectRef idx="0">
+            <a:schemeClr val="accent1"/>
+          </a:effectRef>
+          <a:fontRef idx="minor">
+            <a:schemeClr val="tx1"/>
+          </a:fontRef>
+        </p:style>
+      </p:cxnSp>
+      <p:sp>
+        <p:nvSpPr>
+          <p:cNvPr id="18" name="Rectangle 17"/>
+          <p:cNvSpPr/>
+          <p:nvPr/>
+        </p:nvSpPr>
+        <p:spPr>
+          <a:xfrm>
+            <a:off x="-2590800" y="1219200"/>
+            <a:ext cx="1676400" cy="762000"/>
+          </a:xfrm>
+          <a:prstGeom prst="rect">
+            <a:avLst/>
+          </a:prstGeom>
+        </p:spPr>
+        <p:style>
+          <a:lnRef idx="2">
+            <a:schemeClr val="accent1">
+              <a:shade val="50000"/>
+            </a:schemeClr>
+          </a:lnRef>
+          <a:fillRef idx="1">
+            <a:schemeClr val="accent1"/>
+          </a:fillRef>
+          <a:effectRef idx="0">
+            <a:schemeClr val="accent1"/>
+          </a:effectRef>
+          <a:fontRef idx="minor">
+            <a:schemeClr val="lt1"/>
+          </a:fontRef>
+        </p:style>
+        <p:txBody>
+          <a:bodyPr rtlCol="0" anchor="ctr"/>
+          <a:lstStyle/>
+          <a:p>
+            <a:pPr algn="ctr"/>
+            <a:r>
+              <a:rPr lang="en-US" dirty="0" smtClean="0"/>
+              <a:t>USB Interface:</a:t>
+            </a:r>
+          </a:p>
+          <a:p>
+            <a:pPr algn="ctr"/>
+            <a:r>
+              <a:rPr lang="en-US" dirty="0" smtClean="0"/>
+              <a:t>VDIP</a:t>
+            </a:r>
+            <a:endParaRPr lang="en-US" dirty="0"/>
+          </a:p>
+        </p:txBody>
+      </p:sp>
+      <p:sp>
+        <p:nvSpPr>
+          <p:cNvPr id="19" name="TextBox 18"/>
           <p:cNvSpPr txBox="1"/>
           <p:nvPr/>
         </p:nvSpPr>
         <p:spPr>
           <a:xfrm>
-            <a:off x="457200" y="1676400"/>
-            <a:ext cx="3352800" cy="923330"/>
+            <a:off x="1371600" y="1676400"/>
+            <a:ext cx="2362200" cy="646331"/>
           </a:xfrm>
           <a:prstGeom prst="rect">
             <a:avLst/>
@@ -4532,7 +5389,7 @@
           <a:p>
             <a:r>
               <a:rPr lang="en-US" dirty="0" smtClean="0"/>
-              <a:t>The programmer and code on our website can be used to reprogram the ChapR</a:t>
+              <a:t>Insert flow chart of process and schematic</a:t>
             </a:r>
             <a:endParaRPr lang="en-US" dirty="0"/>
           </a:p>

</xml_diff>